<commit_message>
fix(pptx heritage): sets draft on subject
</commit_message>
<xml_diff>
--- a/assets/04-01-heritage.pptx
+++ b/assets/04-01-heritage.pptx
@@ -6,11 +6,8 @@
   </p:sldMasterIdLst>
   <p:sldIdLst>
     <p:sldId id="257" r:id="rId5"/>
-    <p:sldId id="258" r:id="rId6"/>
-    <p:sldId id="259" r:id="rId7"/>
-    <p:sldId id="267" r:id="rId8"/>
-    <p:sldId id="268" r:id="rId9"/>
-    <p:sldId id="266" r:id="rId10"/>
+    <p:sldId id="269" r:id="rId6"/>
+    <p:sldId id="266" r:id="rId7"/>
   </p:sldIdLst>
   <p:sldSz cx="12192000" cy="6858000"/>
   <p:notesSz cx="6858000" cy="9144000"/>
@@ -248,7 +245,7 @@
           <a:p>
             <a:fld id="{33F6309C-8E8E-4E60-A612-70E839B733E3}" type="datetimeFigureOut">
               <a:rPr lang="fr-CH" smtClean="0"/>
-              <a:t>11.09.2023</a:t>
+              <a:t>14.09.2023</a:t>
             </a:fld>
             <a:endParaRPr lang="fr-CH"/>
           </a:p>
@@ -418,7 +415,7 @@
           <a:p>
             <a:fld id="{33F6309C-8E8E-4E60-A612-70E839B733E3}" type="datetimeFigureOut">
               <a:rPr lang="fr-CH" smtClean="0"/>
-              <a:t>11.09.2023</a:t>
+              <a:t>14.09.2023</a:t>
             </a:fld>
             <a:endParaRPr lang="fr-CH"/>
           </a:p>
@@ -598,7 +595,7 @@
           <a:p>
             <a:fld id="{33F6309C-8E8E-4E60-A612-70E839B733E3}" type="datetimeFigureOut">
               <a:rPr lang="fr-CH" smtClean="0"/>
-              <a:t>11.09.2023</a:t>
+              <a:t>14.09.2023</a:t>
             </a:fld>
             <a:endParaRPr lang="fr-CH"/>
           </a:p>
@@ -768,7 +765,7 @@
           <a:p>
             <a:fld id="{33F6309C-8E8E-4E60-A612-70E839B733E3}" type="datetimeFigureOut">
               <a:rPr lang="fr-CH" smtClean="0"/>
-              <a:t>11.09.2023</a:t>
+              <a:t>14.09.2023</a:t>
             </a:fld>
             <a:endParaRPr lang="fr-CH"/>
           </a:p>
@@ -1014,7 +1011,7 @@
           <a:p>
             <a:fld id="{33F6309C-8E8E-4E60-A612-70E839B733E3}" type="datetimeFigureOut">
               <a:rPr lang="fr-CH" smtClean="0"/>
-              <a:t>11.09.2023</a:t>
+              <a:t>14.09.2023</a:t>
             </a:fld>
             <a:endParaRPr lang="fr-CH"/>
           </a:p>
@@ -1246,7 +1243,7 @@
           <a:p>
             <a:fld id="{33F6309C-8E8E-4E60-A612-70E839B733E3}" type="datetimeFigureOut">
               <a:rPr lang="fr-CH" smtClean="0"/>
-              <a:t>11.09.2023</a:t>
+              <a:t>14.09.2023</a:t>
             </a:fld>
             <a:endParaRPr lang="fr-CH"/>
           </a:p>
@@ -1613,7 +1610,7 @@
           <a:p>
             <a:fld id="{33F6309C-8E8E-4E60-A612-70E839B733E3}" type="datetimeFigureOut">
               <a:rPr lang="fr-CH" smtClean="0"/>
-              <a:t>11.09.2023</a:t>
+              <a:t>14.09.2023</a:t>
             </a:fld>
             <a:endParaRPr lang="fr-CH"/>
           </a:p>
@@ -1731,7 +1728,7 @@
           <a:p>
             <a:fld id="{33F6309C-8E8E-4E60-A612-70E839B733E3}" type="datetimeFigureOut">
               <a:rPr lang="fr-CH" smtClean="0"/>
-              <a:t>11.09.2023</a:t>
+              <a:t>14.09.2023</a:t>
             </a:fld>
             <a:endParaRPr lang="fr-CH"/>
           </a:p>
@@ -1826,7 +1823,7 @@
           <a:p>
             <a:fld id="{33F6309C-8E8E-4E60-A612-70E839B733E3}" type="datetimeFigureOut">
               <a:rPr lang="fr-CH" smtClean="0"/>
-              <a:t>11.09.2023</a:t>
+              <a:t>14.09.2023</a:t>
             </a:fld>
             <a:endParaRPr lang="fr-CH"/>
           </a:p>
@@ -2103,7 +2100,7 @@
           <a:p>
             <a:fld id="{33F6309C-8E8E-4E60-A612-70E839B733E3}" type="datetimeFigureOut">
               <a:rPr lang="fr-CH" smtClean="0"/>
-              <a:t>11.09.2023</a:t>
+              <a:t>14.09.2023</a:t>
             </a:fld>
             <a:endParaRPr lang="fr-CH"/>
           </a:p>
@@ -2360,7 +2357,7 @@
           <a:p>
             <a:fld id="{33F6309C-8E8E-4E60-A612-70E839B733E3}" type="datetimeFigureOut">
               <a:rPr lang="fr-CH" smtClean="0"/>
-              <a:t>11.09.2023</a:t>
+              <a:t>14.09.2023</a:t>
             </a:fld>
             <a:endParaRPr lang="fr-CH"/>
           </a:p>
@@ -2573,7 +2570,7 @@
           <a:p>
             <a:fld id="{33F6309C-8E8E-4E60-A612-70E839B733E3}" type="datetimeFigureOut">
               <a:rPr lang="fr-CH" smtClean="0"/>
-              <a:t>11.09.2023</a:t>
+              <a:t>14.09.2023</a:t>
             </a:fld>
             <a:endParaRPr lang="fr-CH"/>
           </a:p>
@@ -3018,11 +3015,11 @@
           <a:p>
             <a:r>
               <a:rPr lang="fr-FR" dirty="0" smtClean="0"/>
-              <a:t>Programmation Orientée Objet =&gt; Compléments </a:t>
+              <a:t>Programmation Orientée Objet =&gt; </a:t>
             </a:r>
             <a:r>
               <a:rPr lang="fr-FR" dirty="0" smtClean="0"/>
-              <a:t>2</a:t>
+              <a:t>Héritage</a:t>
             </a:r>
             <a:endParaRPr lang="fr-CH" dirty="0"/>
           </a:p>
@@ -3082,7 +3079,7 @@
           <a:p>
             <a:r>
               <a:rPr lang="fr-FR" dirty="0" smtClean="0"/>
-              <a:t>Rappel: Réunir Information et Action</a:t>
+              <a:t>Comment injecter un DLL et travailler en équipe ?</a:t>
             </a:r>
             <a:endParaRPr lang="fr-CH" dirty="0"/>
           </a:p>
@@ -3098,2547 +3095,29 @@
             <p:ph idx="1"/>
           </p:nvPr>
         </p:nvSpPr>
-        <p:spPr>
-          <a:xfrm>
-            <a:off x="838200" y="1825625"/>
-            <a:ext cx="4289981" cy="4351338"/>
-          </a:xfrm>
-          <a:ln>
-            <a:solidFill>
-              <a:schemeClr val="tx1"/>
-            </a:solidFill>
-          </a:ln>
-        </p:spPr>
-        <p:txBody>
-          <a:bodyPr>
-            <a:normAutofit/>
-          </a:bodyPr>
-          <a:lstStyle/>
-          <a:p>
-            <a:pPr marL="0" indent="0">
-              <a:buNone/>
-            </a:pPr>
-            <a:r>
-              <a:rPr lang="fr-FR" dirty="0" smtClean="0"/>
-              <a:t>Exemple pour une personne</a:t>
-            </a:r>
-          </a:p>
-          <a:p>
-            <a:r>
-              <a:rPr lang="fr-FR" dirty="0" smtClean="0"/>
-              <a:t>Informations:</a:t>
-            </a:r>
-          </a:p>
-          <a:p>
-            <a:pPr lvl="1"/>
-            <a:r>
-              <a:rPr lang="fr-FR" dirty="0" smtClean="0"/>
-              <a:t>Nom</a:t>
-            </a:r>
-          </a:p>
-          <a:p>
-            <a:pPr lvl="1"/>
-            <a:r>
-              <a:rPr lang="fr-FR" dirty="0" smtClean="0"/>
-              <a:t>Prénom</a:t>
-            </a:r>
-          </a:p>
-          <a:p>
-            <a:pPr lvl="1"/>
-            <a:r>
-              <a:rPr lang="fr-FR" dirty="0" smtClean="0"/>
-              <a:t>…</a:t>
-            </a:r>
-            <a:endParaRPr lang="fr-FR" dirty="0"/>
-          </a:p>
-          <a:p>
-            <a:r>
-              <a:rPr lang="fr-FR" dirty="0" smtClean="0"/>
-              <a:t>Processus</a:t>
-            </a:r>
-          </a:p>
-          <a:p>
-            <a:pPr lvl="1"/>
-            <a:r>
-              <a:rPr lang="fr-FR" dirty="0" smtClean="0"/>
-              <a:t>Engager</a:t>
-            </a:r>
-          </a:p>
-          <a:p>
-            <a:pPr lvl="1"/>
-            <a:r>
-              <a:rPr lang="fr-FR" dirty="0" smtClean="0"/>
-              <a:t>Licencier</a:t>
-            </a:r>
-          </a:p>
-          <a:p>
-            <a:pPr lvl="1"/>
-            <a:r>
-              <a:rPr lang="fr-FR" dirty="0" smtClean="0"/>
-              <a:t>Verser le salaire</a:t>
-            </a:r>
-          </a:p>
-          <a:p>
-            <a:pPr lvl="1"/>
-            <a:r>
-              <a:rPr lang="fr-FR" dirty="0" smtClean="0"/>
-              <a:t>…</a:t>
-            </a:r>
-            <a:endParaRPr lang="fr-CH" dirty="0"/>
-          </a:p>
-        </p:txBody>
-      </p:sp>
-      <p:sp>
-        <p:nvSpPr>
-          <p:cNvPr id="4" name="Espace réservé du contenu 2"/>
-          <p:cNvSpPr txBox="1">
-            <a:spLocks/>
-          </p:cNvSpPr>
-          <p:nvPr/>
-        </p:nvSpPr>
-        <p:spPr>
-          <a:xfrm>
-            <a:off x="7553306" y="1825625"/>
-            <a:ext cx="4289981" cy="4351338"/>
-          </a:xfrm>
-          <a:prstGeom prst="rect">
-            <a:avLst/>
-          </a:prstGeom>
-          <a:ln>
-            <a:solidFill>
-              <a:schemeClr val="tx1"/>
-            </a:solidFill>
-          </a:ln>
-        </p:spPr>
-        <p:txBody>
-          <a:bodyPr vert="horz" lIns="91440" tIns="45720" rIns="91440" bIns="45720" rtlCol="0">
-            <a:normAutofit/>
-          </a:bodyPr>
-          <a:lstStyle>
-            <a:lvl1pPr marL="228600" indent="-228600" algn="l" defTabSz="914400" rtl="0" eaLnBrk="1" latinLnBrk="0" hangingPunct="1">
-              <a:lnSpc>
-                <a:spcPct val="90000"/>
-              </a:lnSpc>
-              <a:spcBef>
-                <a:spcPts val="1000"/>
-              </a:spcBef>
-              <a:buFont typeface="Arial" panose="020B0604020202020204" pitchFamily="34" charset="0"/>
-              <a:buChar char="•"/>
-              <a:defRPr sz="2800" kern="1200">
-                <a:solidFill>
-                  <a:schemeClr val="tx1"/>
-                </a:solidFill>
-                <a:latin typeface="+mn-lt"/>
-                <a:ea typeface="+mn-ea"/>
-                <a:cs typeface="+mn-cs"/>
-              </a:defRPr>
-            </a:lvl1pPr>
-            <a:lvl2pPr marL="685800" indent="-228600" algn="l" defTabSz="914400" rtl="0" eaLnBrk="1" latinLnBrk="0" hangingPunct="1">
-              <a:lnSpc>
-                <a:spcPct val="90000"/>
-              </a:lnSpc>
-              <a:spcBef>
-                <a:spcPts val="500"/>
-              </a:spcBef>
-              <a:buFont typeface="Arial" panose="020B0604020202020204" pitchFamily="34" charset="0"/>
-              <a:buChar char="•"/>
-              <a:defRPr sz="2400" kern="1200">
-                <a:solidFill>
-                  <a:schemeClr val="tx1"/>
-                </a:solidFill>
-                <a:latin typeface="+mn-lt"/>
-                <a:ea typeface="+mn-ea"/>
-                <a:cs typeface="+mn-cs"/>
-              </a:defRPr>
-            </a:lvl2pPr>
-            <a:lvl3pPr marL="1143000" indent="-228600" algn="l" defTabSz="914400" rtl="0" eaLnBrk="1" latinLnBrk="0" hangingPunct="1">
-              <a:lnSpc>
-                <a:spcPct val="90000"/>
-              </a:lnSpc>
-              <a:spcBef>
-                <a:spcPts val="500"/>
-              </a:spcBef>
-              <a:buFont typeface="Arial" panose="020B0604020202020204" pitchFamily="34" charset="0"/>
-              <a:buChar char="•"/>
-              <a:defRPr sz="2000" kern="1200">
-                <a:solidFill>
-                  <a:schemeClr val="tx1"/>
-                </a:solidFill>
-                <a:latin typeface="+mn-lt"/>
-                <a:ea typeface="+mn-ea"/>
-                <a:cs typeface="+mn-cs"/>
-              </a:defRPr>
-            </a:lvl3pPr>
-            <a:lvl4pPr marL="1600200" indent="-228600" algn="l" defTabSz="914400" rtl="0" eaLnBrk="1" latinLnBrk="0" hangingPunct="1">
-              <a:lnSpc>
-                <a:spcPct val="90000"/>
-              </a:lnSpc>
-              <a:spcBef>
-                <a:spcPts val="500"/>
-              </a:spcBef>
-              <a:buFont typeface="Arial" panose="020B0604020202020204" pitchFamily="34" charset="0"/>
-              <a:buChar char="•"/>
-              <a:defRPr sz="1800" kern="1200">
-                <a:solidFill>
-                  <a:schemeClr val="tx1"/>
-                </a:solidFill>
-                <a:latin typeface="+mn-lt"/>
-                <a:ea typeface="+mn-ea"/>
-                <a:cs typeface="+mn-cs"/>
-              </a:defRPr>
-            </a:lvl4pPr>
-            <a:lvl5pPr marL="2057400" indent="-228600" algn="l" defTabSz="914400" rtl="0" eaLnBrk="1" latinLnBrk="0" hangingPunct="1">
-              <a:lnSpc>
-                <a:spcPct val="90000"/>
-              </a:lnSpc>
-              <a:spcBef>
-                <a:spcPts val="500"/>
-              </a:spcBef>
-              <a:buFont typeface="Arial" panose="020B0604020202020204" pitchFamily="34" charset="0"/>
-              <a:buChar char="•"/>
-              <a:defRPr sz="1800" kern="1200">
-                <a:solidFill>
-                  <a:schemeClr val="tx1"/>
-                </a:solidFill>
-                <a:latin typeface="+mn-lt"/>
-                <a:ea typeface="+mn-ea"/>
-                <a:cs typeface="+mn-cs"/>
-              </a:defRPr>
-            </a:lvl5pPr>
-            <a:lvl6pPr marL="2514600" indent="-228600" algn="l" defTabSz="914400" rtl="0" eaLnBrk="1" latinLnBrk="0" hangingPunct="1">
-              <a:lnSpc>
-                <a:spcPct val="90000"/>
-              </a:lnSpc>
-              <a:spcBef>
-                <a:spcPts val="500"/>
-              </a:spcBef>
-              <a:buFont typeface="Arial" panose="020B0604020202020204" pitchFamily="34" charset="0"/>
-              <a:buChar char="•"/>
-              <a:defRPr sz="1800" kern="1200">
-                <a:solidFill>
-                  <a:schemeClr val="tx1"/>
-                </a:solidFill>
-                <a:latin typeface="+mn-lt"/>
-                <a:ea typeface="+mn-ea"/>
-                <a:cs typeface="+mn-cs"/>
-              </a:defRPr>
-            </a:lvl6pPr>
-            <a:lvl7pPr marL="2971800" indent="-228600" algn="l" defTabSz="914400" rtl="0" eaLnBrk="1" latinLnBrk="0" hangingPunct="1">
-              <a:lnSpc>
-                <a:spcPct val="90000"/>
-              </a:lnSpc>
-              <a:spcBef>
-                <a:spcPts val="500"/>
-              </a:spcBef>
-              <a:buFont typeface="Arial" panose="020B0604020202020204" pitchFamily="34" charset="0"/>
-              <a:buChar char="•"/>
-              <a:defRPr sz="1800" kern="1200">
-                <a:solidFill>
-                  <a:schemeClr val="tx1"/>
-                </a:solidFill>
-                <a:latin typeface="+mn-lt"/>
-                <a:ea typeface="+mn-ea"/>
-                <a:cs typeface="+mn-cs"/>
-              </a:defRPr>
-            </a:lvl7pPr>
-            <a:lvl8pPr marL="3429000" indent="-228600" algn="l" defTabSz="914400" rtl="0" eaLnBrk="1" latinLnBrk="0" hangingPunct="1">
-              <a:lnSpc>
-                <a:spcPct val="90000"/>
-              </a:lnSpc>
-              <a:spcBef>
-                <a:spcPts val="500"/>
-              </a:spcBef>
-              <a:buFont typeface="Arial" panose="020B0604020202020204" pitchFamily="34" charset="0"/>
-              <a:buChar char="•"/>
-              <a:defRPr sz="1800" kern="1200">
-                <a:solidFill>
-                  <a:schemeClr val="tx1"/>
-                </a:solidFill>
-                <a:latin typeface="+mn-lt"/>
-                <a:ea typeface="+mn-ea"/>
-                <a:cs typeface="+mn-cs"/>
-              </a:defRPr>
-            </a:lvl8pPr>
-            <a:lvl9pPr marL="3886200" indent="-228600" algn="l" defTabSz="914400" rtl="0" eaLnBrk="1" latinLnBrk="0" hangingPunct="1">
-              <a:lnSpc>
-                <a:spcPct val="90000"/>
-              </a:lnSpc>
-              <a:spcBef>
-                <a:spcPts val="500"/>
-              </a:spcBef>
-              <a:buFont typeface="Arial" panose="020B0604020202020204" pitchFamily="34" charset="0"/>
-              <a:buChar char="•"/>
-              <a:defRPr sz="1800" kern="1200">
-                <a:solidFill>
-                  <a:schemeClr val="tx1"/>
-                </a:solidFill>
-                <a:latin typeface="+mn-lt"/>
-                <a:ea typeface="+mn-ea"/>
-                <a:cs typeface="+mn-cs"/>
-              </a:defRPr>
-            </a:lvl9pPr>
-          </a:lstStyle>
-          <a:p>
-            <a:pPr marL="0" indent="0">
-              <a:buFont typeface="Arial" panose="020B0604020202020204" pitchFamily="34" charset="0"/>
-              <a:buNone/>
-            </a:pPr>
-            <a:r>
-              <a:rPr lang="fr-FR" dirty="0" smtClean="0"/>
-              <a:t>Exemple pour une fourmi</a:t>
-            </a:r>
-          </a:p>
-          <a:p>
-            <a:r>
-              <a:rPr lang="fr-FR" dirty="0" smtClean="0"/>
-              <a:t>Informations:</a:t>
-            </a:r>
-          </a:p>
-          <a:p>
-            <a:pPr lvl="1"/>
-            <a:r>
-              <a:rPr lang="fr-FR" dirty="0" smtClean="0"/>
-              <a:t>Type (éclaireur, …)</a:t>
-            </a:r>
-          </a:p>
-          <a:p>
-            <a:pPr lvl="1"/>
-            <a:r>
-              <a:rPr lang="fr-FR" dirty="0" smtClean="0"/>
-              <a:t>Couleur</a:t>
-            </a:r>
-          </a:p>
-          <a:p>
-            <a:pPr lvl="1"/>
-            <a:r>
-              <a:rPr lang="fr-FR" dirty="0" smtClean="0"/>
-              <a:t>…</a:t>
-            </a:r>
-          </a:p>
-          <a:p>
-            <a:r>
-              <a:rPr lang="fr-FR" dirty="0" smtClean="0"/>
-              <a:t>Processus</a:t>
-            </a:r>
-          </a:p>
-          <a:p>
-            <a:pPr lvl="1"/>
-            <a:r>
-              <a:rPr lang="fr-FR" dirty="0" smtClean="0"/>
-              <a:t>Déplacer</a:t>
-            </a:r>
-          </a:p>
-          <a:p>
-            <a:pPr lvl="1"/>
-            <a:r>
-              <a:rPr lang="fr-FR" dirty="0" smtClean="0"/>
-              <a:t>Dormir</a:t>
-            </a:r>
-          </a:p>
-          <a:p>
-            <a:pPr lvl="1"/>
-            <a:r>
-              <a:rPr lang="fr-FR" dirty="0" smtClean="0"/>
-              <a:t>Manger</a:t>
-            </a:r>
-          </a:p>
-          <a:p>
-            <a:pPr lvl="1"/>
-            <a:r>
-              <a:rPr lang="fr-FR" dirty="0" smtClean="0"/>
-              <a:t>…</a:t>
-            </a:r>
-            <a:endParaRPr lang="fr-CH" dirty="0"/>
-          </a:p>
-        </p:txBody>
-      </p:sp>
-      <p:pic>
-        <p:nvPicPr>
-          <p:cNvPr id="5" name="Image 4"/>
-          <p:cNvPicPr>
-            <a:picLocks noChangeAspect="1"/>
-          </p:cNvPicPr>
-          <p:nvPr/>
-        </p:nvPicPr>
-        <p:blipFill>
-          <a:blip r:embed="rId2"/>
-          <a:stretch>
-            <a:fillRect/>
-          </a:stretch>
-        </p:blipFill>
-        <p:spPr>
-          <a:xfrm>
-            <a:off x="5354768" y="2977213"/>
-            <a:ext cx="1971950" cy="2048161"/>
-          </a:xfrm>
-          <a:prstGeom prst="rect">
-            <a:avLst/>
-          </a:prstGeom>
-        </p:spPr>
-      </p:pic>
+        <p:spPr/>
+        <p:txBody>
+          <a:bodyPr/>
+          <a:lstStyle/>
+          <a:p>
+            <a:endParaRPr lang="fr-CH"/>
+          </a:p>
+        </p:txBody>
+      </p:sp>
     </p:spTree>
     <p:extLst>
       <p:ext uri="{BB962C8B-B14F-4D97-AF65-F5344CB8AC3E}">
-        <p14:creationId xmlns:p14="http://schemas.microsoft.com/office/powerpoint/2010/main" val="1372379662"/>
+        <p14:creationId xmlns:p14="http://schemas.microsoft.com/office/powerpoint/2010/main" val="3737696326"/>
       </p:ext>
     </p:extLst>
   </p:cSld>
   <p:clrMapOvr>
     <a:masterClrMapping/>
   </p:clrMapOvr>
-  <p:timing>
-    <p:tnLst>
-      <p:par>
-        <p:cTn id="1" dur="indefinite" restart="never" nodeType="tmRoot">
-          <p:childTnLst>
-            <p:seq concurrent="1" nextAc="seek">
-              <p:cTn id="2" dur="indefinite" nodeType="mainSeq">
-                <p:childTnLst>
-                  <p:par>
-                    <p:cTn id="3" fill="hold">
-                      <p:stCondLst>
-                        <p:cond delay="indefinite"/>
-                      </p:stCondLst>
-                      <p:childTnLst>
-                        <p:par>
-                          <p:cTn id="4" fill="hold">
-                            <p:stCondLst>
-                              <p:cond delay="0"/>
-                            </p:stCondLst>
-                            <p:childTnLst>
-                              <p:par>
-                                <p:cTn id="5" presetID="1" presetClass="entr" presetSubtype="0" fill="hold" grpId="0" nodeType="clickEffect">
-                                  <p:stCondLst>
-                                    <p:cond delay="0"/>
-                                  </p:stCondLst>
-                                  <p:childTnLst>
-                                    <p:set>
-                                      <p:cBhvr>
-                                        <p:cTn id="6" dur="1" fill="hold">
-                                          <p:stCondLst>
-                                            <p:cond delay="0"/>
-                                          </p:stCondLst>
-                                        </p:cTn>
-                                        <p:tgtEl>
-                                          <p:spTgt spid="3">
-                                            <p:bg/>
-                                          </p:spTgt>
-                                        </p:tgtEl>
-                                        <p:attrNameLst>
-                                          <p:attrName>style.visibility</p:attrName>
-                                        </p:attrNameLst>
-                                      </p:cBhvr>
-                                      <p:to>
-                                        <p:strVal val="visible"/>
-                                      </p:to>
-                                    </p:set>
-                                  </p:childTnLst>
-                                </p:cTn>
-                              </p:par>
-                              <p:par>
-                                <p:cTn id="7" presetID="1" presetClass="entr" presetSubtype="0" fill="hold" grpId="0" nodeType="withEffect">
-                                  <p:stCondLst>
-                                    <p:cond delay="0"/>
-                                  </p:stCondLst>
-                                  <p:childTnLst>
-                                    <p:set>
-                                      <p:cBhvr>
-                                        <p:cTn id="8" dur="1" fill="hold">
-                                          <p:stCondLst>
-                                            <p:cond delay="0"/>
-                                          </p:stCondLst>
-                                        </p:cTn>
-                                        <p:tgtEl>
-                                          <p:spTgt spid="3">
-                                            <p:txEl>
-                                              <p:pRg st="0" end="0"/>
-                                            </p:txEl>
-                                          </p:spTgt>
-                                        </p:tgtEl>
-                                        <p:attrNameLst>
-                                          <p:attrName>style.visibility</p:attrName>
-                                        </p:attrNameLst>
-                                      </p:cBhvr>
-                                      <p:to>
-                                        <p:strVal val="visible"/>
-                                      </p:to>
-                                    </p:set>
-                                  </p:childTnLst>
-                                </p:cTn>
-                              </p:par>
-                            </p:childTnLst>
-                          </p:cTn>
-                        </p:par>
-                      </p:childTnLst>
-                    </p:cTn>
-                  </p:par>
-                  <p:par>
-                    <p:cTn id="9" fill="hold">
-                      <p:stCondLst>
-                        <p:cond delay="indefinite"/>
-                      </p:stCondLst>
-                      <p:childTnLst>
-                        <p:par>
-                          <p:cTn id="10" fill="hold">
-                            <p:stCondLst>
-                              <p:cond delay="0"/>
-                            </p:stCondLst>
-                            <p:childTnLst>
-                              <p:par>
-                                <p:cTn id="11" presetID="1" presetClass="entr" presetSubtype="0" fill="hold" grpId="0" nodeType="clickEffect">
-                                  <p:stCondLst>
-                                    <p:cond delay="0"/>
-                                  </p:stCondLst>
-                                  <p:childTnLst>
-                                    <p:set>
-                                      <p:cBhvr>
-                                        <p:cTn id="12" dur="1" fill="hold">
-                                          <p:stCondLst>
-                                            <p:cond delay="0"/>
-                                          </p:stCondLst>
-                                        </p:cTn>
-                                        <p:tgtEl>
-                                          <p:spTgt spid="3">
-                                            <p:txEl>
-                                              <p:pRg st="1" end="1"/>
-                                            </p:txEl>
-                                          </p:spTgt>
-                                        </p:tgtEl>
-                                        <p:attrNameLst>
-                                          <p:attrName>style.visibility</p:attrName>
-                                        </p:attrNameLst>
-                                      </p:cBhvr>
-                                      <p:to>
-                                        <p:strVal val="visible"/>
-                                      </p:to>
-                                    </p:set>
-                                  </p:childTnLst>
-                                </p:cTn>
-                              </p:par>
-                              <p:par>
-                                <p:cTn id="13" presetID="1" presetClass="entr" presetSubtype="0" fill="hold" grpId="0" nodeType="withEffect">
-                                  <p:stCondLst>
-                                    <p:cond delay="0"/>
-                                  </p:stCondLst>
-                                  <p:childTnLst>
-                                    <p:set>
-                                      <p:cBhvr>
-                                        <p:cTn id="14" dur="1" fill="hold">
-                                          <p:stCondLst>
-                                            <p:cond delay="0"/>
-                                          </p:stCondLst>
-                                        </p:cTn>
-                                        <p:tgtEl>
-                                          <p:spTgt spid="3">
-                                            <p:txEl>
-                                              <p:pRg st="2" end="2"/>
-                                            </p:txEl>
-                                          </p:spTgt>
-                                        </p:tgtEl>
-                                        <p:attrNameLst>
-                                          <p:attrName>style.visibility</p:attrName>
-                                        </p:attrNameLst>
-                                      </p:cBhvr>
-                                      <p:to>
-                                        <p:strVal val="visible"/>
-                                      </p:to>
-                                    </p:set>
-                                  </p:childTnLst>
-                                </p:cTn>
-                              </p:par>
-                              <p:par>
-                                <p:cTn id="15" presetID="1" presetClass="entr" presetSubtype="0" fill="hold" grpId="0" nodeType="withEffect">
-                                  <p:stCondLst>
-                                    <p:cond delay="0"/>
-                                  </p:stCondLst>
-                                  <p:childTnLst>
-                                    <p:set>
-                                      <p:cBhvr>
-                                        <p:cTn id="16" dur="1" fill="hold">
-                                          <p:stCondLst>
-                                            <p:cond delay="0"/>
-                                          </p:stCondLst>
-                                        </p:cTn>
-                                        <p:tgtEl>
-                                          <p:spTgt spid="3">
-                                            <p:txEl>
-                                              <p:pRg st="3" end="3"/>
-                                            </p:txEl>
-                                          </p:spTgt>
-                                        </p:tgtEl>
-                                        <p:attrNameLst>
-                                          <p:attrName>style.visibility</p:attrName>
-                                        </p:attrNameLst>
-                                      </p:cBhvr>
-                                      <p:to>
-                                        <p:strVal val="visible"/>
-                                      </p:to>
-                                    </p:set>
-                                  </p:childTnLst>
-                                </p:cTn>
-                              </p:par>
-                              <p:par>
-                                <p:cTn id="17" presetID="1" presetClass="entr" presetSubtype="0" fill="hold" grpId="0" nodeType="withEffect">
-                                  <p:stCondLst>
-                                    <p:cond delay="0"/>
-                                  </p:stCondLst>
-                                  <p:childTnLst>
-                                    <p:set>
-                                      <p:cBhvr>
-                                        <p:cTn id="18" dur="1" fill="hold">
-                                          <p:stCondLst>
-                                            <p:cond delay="0"/>
-                                          </p:stCondLst>
-                                        </p:cTn>
-                                        <p:tgtEl>
-                                          <p:spTgt spid="3">
-                                            <p:txEl>
-                                              <p:pRg st="4" end="4"/>
-                                            </p:txEl>
-                                          </p:spTgt>
-                                        </p:tgtEl>
-                                        <p:attrNameLst>
-                                          <p:attrName>style.visibility</p:attrName>
-                                        </p:attrNameLst>
-                                      </p:cBhvr>
-                                      <p:to>
-                                        <p:strVal val="visible"/>
-                                      </p:to>
-                                    </p:set>
-                                  </p:childTnLst>
-                                </p:cTn>
-                              </p:par>
-                            </p:childTnLst>
-                          </p:cTn>
-                        </p:par>
-                      </p:childTnLst>
-                    </p:cTn>
-                  </p:par>
-                  <p:par>
-                    <p:cTn id="19" fill="hold">
-                      <p:stCondLst>
-                        <p:cond delay="indefinite"/>
-                      </p:stCondLst>
-                      <p:childTnLst>
-                        <p:par>
-                          <p:cTn id="20" fill="hold">
-                            <p:stCondLst>
-                              <p:cond delay="0"/>
-                            </p:stCondLst>
-                            <p:childTnLst>
-                              <p:par>
-                                <p:cTn id="21" presetID="1" presetClass="entr" presetSubtype="0" fill="hold" grpId="0" nodeType="clickEffect">
-                                  <p:stCondLst>
-                                    <p:cond delay="0"/>
-                                  </p:stCondLst>
-                                  <p:childTnLst>
-                                    <p:set>
-                                      <p:cBhvr>
-                                        <p:cTn id="22" dur="1" fill="hold">
-                                          <p:stCondLst>
-                                            <p:cond delay="0"/>
-                                          </p:stCondLst>
-                                        </p:cTn>
-                                        <p:tgtEl>
-                                          <p:spTgt spid="3">
-                                            <p:txEl>
-                                              <p:pRg st="5" end="5"/>
-                                            </p:txEl>
-                                          </p:spTgt>
-                                        </p:tgtEl>
-                                        <p:attrNameLst>
-                                          <p:attrName>style.visibility</p:attrName>
-                                        </p:attrNameLst>
-                                      </p:cBhvr>
-                                      <p:to>
-                                        <p:strVal val="visible"/>
-                                      </p:to>
-                                    </p:set>
-                                  </p:childTnLst>
-                                </p:cTn>
-                              </p:par>
-                              <p:par>
-                                <p:cTn id="23" presetID="1" presetClass="entr" presetSubtype="0" fill="hold" grpId="0" nodeType="withEffect">
-                                  <p:stCondLst>
-                                    <p:cond delay="0"/>
-                                  </p:stCondLst>
-                                  <p:childTnLst>
-                                    <p:set>
-                                      <p:cBhvr>
-                                        <p:cTn id="24" dur="1" fill="hold">
-                                          <p:stCondLst>
-                                            <p:cond delay="0"/>
-                                          </p:stCondLst>
-                                        </p:cTn>
-                                        <p:tgtEl>
-                                          <p:spTgt spid="3">
-                                            <p:txEl>
-                                              <p:pRg st="6" end="6"/>
-                                            </p:txEl>
-                                          </p:spTgt>
-                                        </p:tgtEl>
-                                        <p:attrNameLst>
-                                          <p:attrName>style.visibility</p:attrName>
-                                        </p:attrNameLst>
-                                      </p:cBhvr>
-                                      <p:to>
-                                        <p:strVal val="visible"/>
-                                      </p:to>
-                                    </p:set>
-                                  </p:childTnLst>
-                                </p:cTn>
-                              </p:par>
-                              <p:par>
-                                <p:cTn id="25" presetID="1" presetClass="entr" presetSubtype="0" fill="hold" grpId="0" nodeType="withEffect">
-                                  <p:stCondLst>
-                                    <p:cond delay="0"/>
-                                  </p:stCondLst>
-                                  <p:childTnLst>
-                                    <p:set>
-                                      <p:cBhvr>
-                                        <p:cTn id="26" dur="1" fill="hold">
-                                          <p:stCondLst>
-                                            <p:cond delay="0"/>
-                                          </p:stCondLst>
-                                        </p:cTn>
-                                        <p:tgtEl>
-                                          <p:spTgt spid="3">
-                                            <p:txEl>
-                                              <p:pRg st="7" end="7"/>
-                                            </p:txEl>
-                                          </p:spTgt>
-                                        </p:tgtEl>
-                                        <p:attrNameLst>
-                                          <p:attrName>style.visibility</p:attrName>
-                                        </p:attrNameLst>
-                                      </p:cBhvr>
-                                      <p:to>
-                                        <p:strVal val="visible"/>
-                                      </p:to>
-                                    </p:set>
-                                  </p:childTnLst>
-                                </p:cTn>
-                              </p:par>
-                              <p:par>
-                                <p:cTn id="27" presetID="1" presetClass="entr" presetSubtype="0" fill="hold" grpId="0" nodeType="withEffect">
-                                  <p:stCondLst>
-                                    <p:cond delay="0"/>
-                                  </p:stCondLst>
-                                  <p:childTnLst>
-                                    <p:set>
-                                      <p:cBhvr>
-                                        <p:cTn id="28" dur="1" fill="hold">
-                                          <p:stCondLst>
-                                            <p:cond delay="0"/>
-                                          </p:stCondLst>
-                                        </p:cTn>
-                                        <p:tgtEl>
-                                          <p:spTgt spid="3">
-                                            <p:txEl>
-                                              <p:pRg st="8" end="8"/>
-                                            </p:txEl>
-                                          </p:spTgt>
-                                        </p:tgtEl>
-                                        <p:attrNameLst>
-                                          <p:attrName>style.visibility</p:attrName>
-                                        </p:attrNameLst>
-                                      </p:cBhvr>
-                                      <p:to>
-                                        <p:strVal val="visible"/>
-                                      </p:to>
-                                    </p:set>
-                                  </p:childTnLst>
-                                </p:cTn>
-                              </p:par>
-                              <p:par>
-                                <p:cTn id="29" presetID="1" presetClass="entr" presetSubtype="0" fill="hold" grpId="0" nodeType="withEffect">
-                                  <p:stCondLst>
-                                    <p:cond delay="0"/>
-                                  </p:stCondLst>
-                                  <p:childTnLst>
-                                    <p:set>
-                                      <p:cBhvr>
-                                        <p:cTn id="30" dur="1" fill="hold">
-                                          <p:stCondLst>
-                                            <p:cond delay="0"/>
-                                          </p:stCondLst>
-                                        </p:cTn>
-                                        <p:tgtEl>
-                                          <p:spTgt spid="3">
-                                            <p:txEl>
-                                              <p:pRg st="9" end="9"/>
-                                            </p:txEl>
-                                          </p:spTgt>
-                                        </p:tgtEl>
-                                        <p:attrNameLst>
-                                          <p:attrName>style.visibility</p:attrName>
-                                        </p:attrNameLst>
-                                      </p:cBhvr>
-                                      <p:to>
-                                        <p:strVal val="visible"/>
-                                      </p:to>
-                                    </p:set>
-                                  </p:childTnLst>
-                                </p:cTn>
-                              </p:par>
-                            </p:childTnLst>
-                          </p:cTn>
-                        </p:par>
-                      </p:childTnLst>
-                    </p:cTn>
-                  </p:par>
-                  <p:par>
-                    <p:cTn id="31" fill="hold">
-                      <p:stCondLst>
-                        <p:cond delay="indefinite"/>
-                      </p:stCondLst>
-                      <p:childTnLst>
-                        <p:par>
-                          <p:cTn id="32" fill="hold">
-                            <p:stCondLst>
-                              <p:cond delay="0"/>
-                            </p:stCondLst>
-                            <p:childTnLst>
-                              <p:par>
-                                <p:cTn id="33" presetID="1" presetClass="entr" presetSubtype="0" fill="hold" grpId="0" nodeType="clickEffect">
-                                  <p:stCondLst>
-                                    <p:cond delay="0"/>
-                                  </p:stCondLst>
-                                  <p:childTnLst>
-                                    <p:set>
-                                      <p:cBhvr>
-                                        <p:cTn id="34" dur="1" fill="hold">
-                                          <p:stCondLst>
-                                            <p:cond delay="0"/>
-                                          </p:stCondLst>
-                                        </p:cTn>
-                                        <p:tgtEl>
-                                          <p:spTgt spid="4"/>
-                                        </p:tgtEl>
-                                        <p:attrNameLst>
-                                          <p:attrName>style.visibility</p:attrName>
-                                        </p:attrNameLst>
-                                      </p:cBhvr>
-                                      <p:to>
-                                        <p:strVal val="visible"/>
-                                      </p:to>
-                                    </p:set>
-                                  </p:childTnLst>
-                                </p:cTn>
-                              </p:par>
-                            </p:childTnLst>
-                          </p:cTn>
-                        </p:par>
-                      </p:childTnLst>
-                    </p:cTn>
-                  </p:par>
-                </p:childTnLst>
-              </p:cTn>
-              <p:prevCondLst>
-                <p:cond evt="onPrev" delay="0">
-                  <p:tgtEl>
-                    <p:sldTgt/>
-                  </p:tgtEl>
-                </p:cond>
-              </p:prevCondLst>
-              <p:nextCondLst>
-                <p:cond evt="onNext" delay="0">
-                  <p:tgtEl>
-                    <p:sldTgt/>
-                  </p:tgtEl>
-                </p:cond>
-              </p:nextCondLst>
-            </p:seq>
-          </p:childTnLst>
-        </p:cTn>
-      </p:par>
-    </p:tnLst>
-    <p:bldLst>
-      <p:bldP spid="3" grpId="0" uiExpand="1" build="p" animBg="1"/>
-      <p:bldP spid="4" grpId="0" animBg="1"/>
-    </p:bldLst>
-  </p:timing>
 </p:sld>
 </file>
 
 <file path=ppt/slides/slide3.xml><?xml version="1.0" encoding="utf-8"?>
-<p:sld xmlns:a="http://schemas.openxmlformats.org/drawingml/2006/main" xmlns:r="http://schemas.openxmlformats.org/officeDocument/2006/relationships" xmlns:p="http://schemas.openxmlformats.org/presentationml/2006/main">
-  <p:cSld>
-    <p:spTree>
-      <p:nvGrpSpPr>
-        <p:cNvPr id="1" name=""/>
-        <p:cNvGrpSpPr/>
-        <p:nvPr/>
-      </p:nvGrpSpPr>
-      <p:grpSpPr>
-        <a:xfrm>
-          <a:off x="0" y="0"/>
-          <a:ext cx="0" cy="0"/>
-          <a:chOff x="0" y="0"/>
-          <a:chExt cx="0" cy="0"/>
-        </a:xfrm>
-      </p:grpSpPr>
-      <p:sp>
-        <p:nvSpPr>
-          <p:cNvPr id="4" name="Ellipse 3"/>
-          <p:cNvSpPr/>
-          <p:nvPr/>
-        </p:nvSpPr>
-        <p:spPr>
-          <a:xfrm>
-            <a:off x="499317" y="3725172"/>
-            <a:ext cx="10122754" cy="1437183"/>
-          </a:xfrm>
-          <a:prstGeom prst="ellipse">
-            <a:avLst/>
-          </a:prstGeom>
-        </p:spPr>
-        <p:style>
-          <a:lnRef idx="2">
-            <a:schemeClr val="accent1">
-              <a:shade val="50000"/>
-            </a:schemeClr>
-          </a:lnRef>
-          <a:fillRef idx="1">
-            <a:schemeClr val="accent1"/>
-          </a:fillRef>
-          <a:effectRef idx="0">
-            <a:schemeClr val="accent1"/>
-          </a:effectRef>
-          <a:fontRef idx="minor">
-            <a:schemeClr val="lt1"/>
-          </a:fontRef>
-        </p:style>
-        <p:txBody>
-          <a:bodyPr rtlCol="0" anchor="ctr"/>
-          <a:lstStyle/>
-          <a:p>
-            <a:pPr algn="ctr"/>
-            <a:endParaRPr lang="fr-CH"/>
-          </a:p>
-        </p:txBody>
-      </p:sp>
-      <p:sp>
-        <p:nvSpPr>
-          <p:cNvPr id="2" name="Titre 1"/>
-          <p:cNvSpPr>
-            <a:spLocks noGrp="1"/>
-          </p:cNvSpPr>
-          <p:nvPr>
-            <p:ph type="title"/>
-          </p:nvPr>
-        </p:nvSpPr>
-        <p:spPr/>
-        <p:txBody>
-          <a:bodyPr/>
-          <a:lstStyle/>
-          <a:p>
-            <a:r>
-              <a:rPr lang="fr-FR" dirty="0" smtClean="0"/>
-              <a:t>Rappel : Termes pour décrire les éléments OO</a:t>
-            </a:r>
-            <a:endParaRPr lang="fr-CH" dirty="0"/>
-          </a:p>
-        </p:txBody>
-      </p:sp>
-      <p:sp>
-        <p:nvSpPr>
-          <p:cNvPr id="3" name="Espace réservé du contenu 2"/>
-          <p:cNvSpPr>
-            <a:spLocks noGrp="1"/>
-          </p:cNvSpPr>
-          <p:nvPr>
-            <p:ph idx="1"/>
-          </p:nvPr>
-        </p:nvSpPr>
-        <p:spPr/>
-        <p:txBody>
-          <a:bodyPr>
-            <a:normAutofit/>
-          </a:bodyPr>
-          <a:lstStyle/>
-          <a:p>
-            <a:pPr marL="514350" indent="-514350">
-              <a:buFont typeface="+mj-lt"/>
-              <a:buAutoNum type="arabicPeriod"/>
-            </a:pPr>
-            <a:r>
-              <a:rPr lang="fr-FR" dirty="0" err="1" smtClean="0"/>
-              <a:t>Namespace</a:t>
-            </a:r>
-            <a:r>
-              <a:rPr lang="fr-FR" dirty="0" smtClean="0"/>
-              <a:t> (espace de nom) :"dossier virtuel" qui regroupe les classes</a:t>
-            </a:r>
-          </a:p>
-          <a:p>
-            <a:pPr lvl="1"/>
-            <a:r>
-              <a:rPr lang="fr-FR" dirty="0"/>
-              <a:t>Classe : nom de l’objet, par exemple Personne</a:t>
-            </a:r>
-          </a:p>
-          <a:p>
-            <a:pPr lvl="2"/>
-            <a:r>
-              <a:rPr lang="fr-FR" dirty="0"/>
-              <a:t>Attribut : caractéristique de l’objet (nom, prénom, âge) = variable</a:t>
-            </a:r>
-          </a:p>
-          <a:p>
-            <a:pPr lvl="2"/>
-            <a:r>
-              <a:rPr lang="fr-FR" dirty="0"/>
-              <a:t>Méthode : processus de l’objet (engager, licencier,…) = </a:t>
-            </a:r>
-            <a:r>
-              <a:rPr lang="fr-FR" dirty="0" smtClean="0"/>
-              <a:t>fonction</a:t>
-            </a:r>
-          </a:p>
-          <a:p>
-            <a:pPr lvl="1"/>
-            <a:endParaRPr lang="fr-FR" dirty="0" smtClean="0"/>
-          </a:p>
-          <a:p>
-            <a:pPr marL="514350" indent="-514350">
-              <a:buFont typeface="+mj-lt"/>
-              <a:buAutoNum type="arabicPeriod"/>
-            </a:pPr>
-            <a:r>
-              <a:rPr lang="fr-FR" dirty="0"/>
-              <a:t>Instance : incarnation d’un objet, par exemple Jean, Bob, </a:t>
-            </a:r>
-            <a:r>
-              <a:rPr lang="fr-FR" dirty="0" smtClean="0"/>
-              <a:t>Alice</a:t>
-            </a:r>
-          </a:p>
-          <a:p>
-            <a:pPr marL="514350" indent="-514350">
-              <a:buFont typeface="+mj-lt"/>
-              <a:buAutoNum type="arabicPeriod"/>
-            </a:pPr>
-            <a:endParaRPr lang="fr-FR" dirty="0" smtClean="0"/>
-          </a:p>
-          <a:p>
-            <a:pPr marL="514350" indent="-514350">
-              <a:buFont typeface="+mj-lt"/>
-              <a:buAutoNum type="arabicPeriod"/>
-            </a:pPr>
-            <a:r>
-              <a:rPr lang="fr-FR" dirty="0" smtClean="0"/>
-              <a:t>Visibilité (classe, attribut, méthode)</a:t>
-            </a:r>
-          </a:p>
-          <a:p>
-            <a:pPr marL="457200" lvl="1" indent="0">
-              <a:buNone/>
-            </a:pPr>
-            <a:endParaRPr lang="fr-FR" dirty="0" smtClean="0"/>
-          </a:p>
-        </p:txBody>
-      </p:sp>
-    </p:spTree>
-    <p:extLst>
-      <p:ext uri="{BB962C8B-B14F-4D97-AF65-F5344CB8AC3E}">
-        <p14:creationId xmlns:p14="http://schemas.microsoft.com/office/powerpoint/2010/main" val="40764276"/>
-      </p:ext>
-    </p:extLst>
-  </p:cSld>
-  <p:clrMapOvr>
-    <a:masterClrMapping/>
-  </p:clrMapOvr>
-  <p:timing>
-    <p:tnLst>
-      <p:par>
-        <p:cTn id="1" dur="indefinite" restart="never" nodeType="tmRoot">
-          <p:childTnLst>
-            <p:seq concurrent="1" nextAc="seek">
-              <p:cTn id="2" dur="indefinite" nodeType="mainSeq">
-                <p:childTnLst>
-                  <p:par>
-                    <p:cTn id="3" fill="hold">
-                      <p:stCondLst>
-                        <p:cond delay="indefinite"/>
-                      </p:stCondLst>
-                      <p:childTnLst>
-                        <p:par>
-                          <p:cTn id="4" fill="hold">
-                            <p:stCondLst>
-                              <p:cond delay="0"/>
-                            </p:stCondLst>
-                            <p:childTnLst>
-                              <p:par>
-                                <p:cTn id="5" presetID="1" presetClass="entr" presetSubtype="0" fill="hold" grpId="0" nodeType="clickEffect">
-                                  <p:stCondLst>
-                                    <p:cond delay="0"/>
-                                  </p:stCondLst>
-                                  <p:childTnLst>
-                                    <p:set>
-                                      <p:cBhvr>
-                                        <p:cTn id="6" dur="1" fill="hold">
-                                          <p:stCondLst>
-                                            <p:cond delay="0"/>
-                                          </p:stCondLst>
-                                        </p:cTn>
-                                        <p:tgtEl>
-                                          <p:spTgt spid="3">
-                                            <p:txEl>
-                                              <p:pRg st="0" end="0"/>
-                                            </p:txEl>
-                                          </p:spTgt>
-                                        </p:tgtEl>
-                                        <p:attrNameLst>
-                                          <p:attrName>style.visibility</p:attrName>
-                                        </p:attrNameLst>
-                                      </p:cBhvr>
-                                      <p:to>
-                                        <p:strVal val="visible"/>
-                                      </p:to>
-                                    </p:set>
-                                  </p:childTnLst>
-                                </p:cTn>
-                              </p:par>
-                            </p:childTnLst>
-                          </p:cTn>
-                        </p:par>
-                      </p:childTnLst>
-                    </p:cTn>
-                  </p:par>
-                  <p:par>
-                    <p:cTn id="7" fill="hold">
-                      <p:stCondLst>
-                        <p:cond delay="indefinite"/>
-                      </p:stCondLst>
-                      <p:childTnLst>
-                        <p:par>
-                          <p:cTn id="8" fill="hold">
-                            <p:stCondLst>
-                              <p:cond delay="0"/>
-                            </p:stCondLst>
-                            <p:childTnLst>
-                              <p:par>
-                                <p:cTn id="9" presetID="1" presetClass="entr" presetSubtype="0" fill="hold" grpId="0" nodeType="clickEffect">
-                                  <p:stCondLst>
-                                    <p:cond delay="0"/>
-                                  </p:stCondLst>
-                                  <p:childTnLst>
-                                    <p:set>
-                                      <p:cBhvr>
-                                        <p:cTn id="10" dur="1" fill="hold">
-                                          <p:stCondLst>
-                                            <p:cond delay="0"/>
-                                          </p:stCondLst>
-                                        </p:cTn>
-                                        <p:tgtEl>
-                                          <p:spTgt spid="3">
-                                            <p:txEl>
-                                              <p:pRg st="1" end="1"/>
-                                            </p:txEl>
-                                          </p:spTgt>
-                                        </p:tgtEl>
-                                        <p:attrNameLst>
-                                          <p:attrName>style.visibility</p:attrName>
-                                        </p:attrNameLst>
-                                      </p:cBhvr>
-                                      <p:to>
-                                        <p:strVal val="visible"/>
-                                      </p:to>
-                                    </p:set>
-                                  </p:childTnLst>
-                                </p:cTn>
-                              </p:par>
-                            </p:childTnLst>
-                          </p:cTn>
-                        </p:par>
-                      </p:childTnLst>
-                    </p:cTn>
-                  </p:par>
-                  <p:par>
-                    <p:cTn id="11" fill="hold">
-                      <p:stCondLst>
-                        <p:cond delay="indefinite"/>
-                      </p:stCondLst>
-                      <p:childTnLst>
-                        <p:par>
-                          <p:cTn id="12" fill="hold">
-                            <p:stCondLst>
-                              <p:cond delay="0"/>
-                            </p:stCondLst>
-                            <p:childTnLst>
-                              <p:par>
-                                <p:cTn id="13" presetID="1" presetClass="entr" presetSubtype="0" fill="hold" grpId="0" nodeType="clickEffect">
-                                  <p:stCondLst>
-                                    <p:cond delay="0"/>
-                                  </p:stCondLst>
-                                  <p:childTnLst>
-                                    <p:set>
-                                      <p:cBhvr>
-                                        <p:cTn id="14" dur="1" fill="hold">
-                                          <p:stCondLst>
-                                            <p:cond delay="0"/>
-                                          </p:stCondLst>
-                                        </p:cTn>
-                                        <p:tgtEl>
-                                          <p:spTgt spid="3">
-                                            <p:txEl>
-                                              <p:pRg st="2" end="2"/>
-                                            </p:txEl>
-                                          </p:spTgt>
-                                        </p:tgtEl>
-                                        <p:attrNameLst>
-                                          <p:attrName>style.visibility</p:attrName>
-                                        </p:attrNameLst>
-                                      </p:cBhvr>
-                                      <p:to>
-                                        <p:strVal val="visible"/>
-                                      </p:to>
-                                    </p:set>
-                                  </p:childTnLst>
-                                </p:cTn>
-                              </p:par>
-                            </p:childTnLst>
-                          </p:cTn>
-                        </p:par>
-                      </p:childTnLst>
-                    </p:cTn>
-                  </p:par>
-                  <p:par>
-                    <p:cTn id="15" fill="hold">
-                      <p:stCondLst>
-                        <p:cond delay="indefinite"/>
-                      </p:stCondLst>
-                      <p:childTnLst>
-                        <p:par>
-                          <p:cTn id="16" fill="hold">
-                            <p:stCondLst>
-                              <p:cond delay="0"/>
-                            </p:stCondLst>
-                            <p:childTnLst>
-                              <p:par>
-                                <p:cTn id="17" presetID="1" presetClass="entr" presetSubtype="0" fill="hold" grpId="0" nodeType="clickEffect">
-                                  <p:stCondLst>
-                                    <p:cond delay="0"/>
-                                  </p:stCondLst>
-                                  <p:childTnLst>
-                                    <p:set>
-                                      <p:cBhvr>
-                                        <p:cTn id="18" dur="1" fill="hold">
-                                          <p:stCondLst>
-                                            <p:cond delay="0"/>
-                                          </p:stCondLst>
-                                        </p:cTn>
-                                        <p:tgtEl>
-                                          <p:spTgt spid="3">
-                                            <p:txEl>
-                                              <p:pRg st="3" end="3"/>
-                                            </p:txEl>
-                                          </p:spTgt>
-                                        </p:tgtEl>
-                                        <p:attrNameLst>
-                                          <p:attrName>style.visibility</p:attrName>
-                                        </p:attrNameLst>
-                                      </p:cBhvr>
-                                      <p:to>
-                                        <p:strVal val="visible"/>
-                                      </p:to>
-                                    </p:set>
-                                  </p:childTnLst>
-                                </p:cTn>
-                              </p:par>
-                            </p:childTnLst>
-                          </p:cTn>
-                        </p:par>
-                      </p:childTnLst>
-                    </p:cTn>
-                  </p:par>
-                  <p:par>
-                    <p:cTn id="19" fill="hold">
-                      <p:stCondLst>
-                        <p:cond delay="indefinite"/>
-                      </p:stCondLst>
-                      <p:childTnLst>
-                        <p:par>
-                          <p:cTn id="20" fill="hold">
-                            <p:stCondLst>
-                              <p:cond delay="0"/>
-                            </p:stCondLst>
-                            <p:childTnLst>
-                              <p:par>
-                                <p:cTn id="21" presetID="1" presetClass="entr" presetSubtype="0" fill="hold" grpId="0" nodeType="clickEffect">
-                                  <p:stCondLst>
-                                    <p:cond delay="0"/>
-                                  </p:stCondLst>
-                                  <p:childTnLst>
-                                    <p:set>
-                                      <p:cBhvr>
-                                        <p:cTn id="22" dur="1" fill="hold">
-                                          <p:stCondLst>
-                                            <p:cond delay="0"/>
-                                          </p:stCondLst>
-                                        </p:cTn>
-                                        <p:tgtEl>
-                                          <p:spTgt spid="3">
-                                            <p:txEl>
-                                              <p:pRg st="5" end="5"/>
-                                            </p:txEl>
-                                          </p:spTgt>
-                                        </p:tgtEl>
-                                        <p:attrNameLst>
-                                          <p:attrName>style.visibility</p:attrName>
-                                        </p:attrNameLst>
-                                      </p:cBhvr>
-                                      <p:to>
-                                        <p:strVal val="visible"/>
-                                      </p:to>
-                                    </p:set>
-                                  </p:childTnLst>
-                                </p:cTn>
-                              </p:par>
-                            </p:childTnLst>
-                          </p:cTn>
-                        </p:par>
-                      </p:childTnLst>
-                    </p:cTn>
-                  </p:par>
-                  <p:par>
-                    <p:cTn id="23" fill="hold">
-                      <p:stCondLst>
-                        <p:cond delay="indefinite"/>
-                      </p:stCondLst>
-                      <p:childTnLst>
-                        <p:par>
-                          <p:cTn id="24" fill="hold">
-                            <p:stCondLst>
-                              <p:cond delay="0"/>
-                            </p:stCondLst>
-                            <p:childTnLst>
-                              <p:par>
-                                <p:cTn id="25" presetID="1" presetClass="entr" presetSubtype="0" fill="hold" grpId="0" nodeType="clickEffect">
-                                  <p:stCondLst>
-                                    <p:cond delay="0"/>
-                                  </p:stCondLst>
-                                  <p:childTnLst>
-                                    <p:set>
-                                      <p:cBhvr>
-                                        <p:cTn id="26" dur="1" fill="hold">
-                                          <p:stCondLst>
-                                            <p:cond delay="0"/>
-                                          </p:stCondLst>
-                                        </p:cTn>
-                                        <p:tgtEl>
-                                          <p:spTgt spid="3">
-                                            <p:txEl>
-                                              <p:pRg st="7" end="7"/>
-                                            </p:txEl>
-                                          </p:spTgt>
-                                        </p:tgtEl>
-                                        <p:attrNameLst>
-                                          <p:attrName>style.visibility</p:attrName>
-                                        </p:attrNameLst>
-                                      </p:cBhvr>
-                                      <p:to>
-                                        <p:strVal val="visible"/>
-                                      </p:to>
-                                    </p:set>
-                                  </p:childTnLst>
-                                </p:cTn>
-                              </p:par>
-                            </p:childTnLst>
-                          </p:cTn>
-                        </p:par>
-                      </p:childTnLst>
-                    </p:cTn>
-                  </p:par>
-                  <p:par>
-                    <p:cTn id="27" fill="hold">
-                      <p:stCondLst>
-                        <p:cond delay="indefinite"/>
-                      </p:stCondLst>
-                      <p:childTnLst>
-                        <p:par>
-                          <p:cTn id="28" fill="hold">
-                            <p:stCondLst>
-                              <p:cond delay="0"/>
-                            </p:stCondLst>
-                            <p:childTnLst>
-                              <p:par>
-                                <p:cTn id="29" presetID="1" presetClass="entr" presetSubtype="0" fill="hold" grpId="0" nodeType="clickEffect">
-                                  <p:stCondLst>
-                                    <p:cond delay="0"/>
-                                  </p:stCondLst>
-                                  <p:childTnLst>
-                                    <p:set>
-                                      <p:cBhvr>
-                                        <p:cTn id="30" dur="1" fill="hold">
-                                          <p:stCondLst>
-                                            <p:cond delay="0"/>
-                                          </p:stCondLst>
-                                        </p:cTn>
-                                        <p:tgtEl>
-                                          <p:spTgt spid="4"/>
-                                        </p:tgtEl>
-                                        <p:attrNameLst>
-                                          <p:attrName>style.visibility</p:attrName>
-                                        </p:attrNameLst>
-                                      </p:cBhvr>
-                                      <p:to>
-                                        <p:strVal val="visible"/>
-                                      </p:to>
-                                    </p:set>
-                                  </p:childTnLst>
-                                </p:cTn>
-                              </p:par>
-                            </p:childTnLst>
-                          </p:cTn>
-                        </p:par>
-                      </p:childTnLst>
-                    </p:cTn>
-                  </p:par>
-                </p:childTnLst>
-              </p:cTn>
-              <p:prevCondLst>
-                <p:cond evt="onPrev" delay="0">
-                  <p:tgtEl>
-                    <p:sldTgt/>
-                  </p:tgtEl>
-                </p:cond>
-              </p:prevCondLst>
-              <p:nextCondLst>
-                <p:cond evt="onNext" delay="0">
-                  <p:tgtEl>
-                    <p:sldTgt/>
-                  </p:tgtEl>
-                </p:cond>
-              </p:nextCondLst>
-            </p:seq>
-          </p:childTnLst>
-        </p:cTn>
-      </p:par>
-    </p:tnLst>
-    <p:bldLst>
-      <p:bldP spid="4" grpId="0" animBg="1"/>
-      <p:bldP spid="3" grpId="0" uiExpand="1" build="p"/>
-    </p:bldLst>
-  </p:timing>
-</p:sld>
-</file>
-
-<file path=ppt/slides/slide4.xml><?xml version="1.0" encoding="utf-8"?>
-<p:sld xmlns:a="http://schemas.openxmlformats.org/drawingml/2006/main" xmlns:r="http://schemas.openxmlformats.org/officeDocument/2006/relationships" xmlns:p="http://schemas.openxmlformats.org/presentationml/2006/main">
-  <p:cSld>
-    <p:spTree>
-      <p:nvGrpSpPr>
-        <p:cNvPr id="1" name=""/>
-        <p:cNvGrpSpPr/>
-        <p:nvPr/>
-      </p:nvGrpSpPr>
-      <p:grpSpPr>
-        <a:xfrm>
-          <a:off x="0" y="0"/>
-          <a:ext cx="0" cy="0"/>
-          <a:chOff x="0" y="0"/>
-          <a:chExt cx="0" cy="0"/>
-        </a:xfrm>
-      </p:grpSpPr>
-      <p:sp>
-        <p:nvSpPr>
-          <p:cNvPr id="2" name="Titre 1"/>
-          <p:cNvSpPr>
-            <a:spLocks noGrp="1"/>
-          </p:cNvSpPr>
-          <p:nvPr>
-            <p:ph type="title"/>
-          </p:nvPr>
-        </p:nvSpPr>
-        <p:spPr/>
-        <p:txBody>
-          <a:bodyPr/>
-          <a:lstStyle/>
-          <a:p>
-            <a:r>
-              <a:rPr lang="fr-FR" dirty="0" smtClean="0"/>
-              <a:t>Méthode spéciale dite "constructeur"</a:t>
-            </a:r>
-            <a:endParaRPr lang="fr-CH" dirty="0"/>
-          </a:p>
-        </p:txBody>
-      </p:sp>
-      <p:sp>
-        <p:nvSpPr>
-          <p:cNvPr id="3" name="Espace réservé du contenu 2"/>
-          <p:cNvSpPr>
-            <a:spLocks noGrp="1"/>
-          </p:cNvSpPr>
-          <p:nvPr>
-            <p:ph idx="1"/>
-          </p:nvPr>
-        </p:nvSpPr>
-        <p:spPr/>
-        <p:txBody>
-          <a:bodyPr>
-            <a:normAutofit lnSpcReduction="10000"/>
-          </a:bodyPr>
-          <a:lstStyle/>
-          <a:p>
-            <a:r>
-              <a:rPr lang="fr-FR" dirty="0" smtClean="0"/>
-              <a:t>Appelée automatiquement en utilisant le mot clé "NEW"</a:t>
-            </a:r>
-            <a:r>
-              <a:rPr lang="fr-CH" dirty="0" smtClean="0"/>
-              <a:t>:</a:t>
-            </a:r>
-          </a:p>
-          <a:p>
-            <a:pPr marL="0" indent="0">
-              <a:buNone/>
-            </a:pPr>
-            <a:endParaRPr lang="fr-FR" dirty="0" smtClean="0"/>
-          </a:p>
-          <a:p>
-            <a:pPr marL="0" indent="0">
-              <a:buNone/>
-            </a:pPr>
-            <a:r>
-              <a:rPr lang="fr-FR" dirty="0" smtClean="0"/>
-              <a:t>var bob = new Person();</a:t>
-            </a:r>
-          </a:p>
-          <a:p>
-            <a:pPr marL="0" indent="0">
-              <a:buNone/>
-            </a:pPr>
-            <a:endParaRPr lang="fr-FR" dirty="0" smtClean="0"/>
-          </a:p>
-          <a:p>
-            <a:pPr marL="0" indent="0">
-              <a:buNone/>
-            </a:pPr>
-            <a:r>
-              <a:rPr lang="fr-FR" dirty="0" smtClean="0"/>
-              <a:t>class Person{</a:t>
-            </a:r>
-          </a:p>
-          <a:p>
-            <a:pPr marL="0" indent="0">
-              <a:buNone/>
-            </a:pPr>
-            <a:r>
-              <a:rPr lang="fr-FR" dirty="0" smtClean="0"/>
-              <a:t>	</a:t>
-            </a:r>
-            <a:r>
-              <a:rPr lang="fr-FR" dirty="0"/>
-              <a:t>public </a:t>
-            </a:r>
-            <a:r>
-              <a:rPr lang="fr-FR" dirty="0" err="1" smtClean="0"/>
-              <a:t>void</a:t>
-            </a:r>
-            <a:r>
-              <a:rPr lang="fr-FR" dirty="0" smtClean="0"/>
-              <a:t> Person(){}</a:t>
-            </a:r>
-          </a:p>
-          <a:p>
-            <a:pPr marL="0" indent="0">
-              <a:buNone/>
-            </a:pPr>
-            <a:r>
-              <a:rPr lang="fr-FR" dirty="0" smtClean="0"/>
-              <a:t>}</a:t>
-            </a:r>
-            <a:endParaRPr lang="fr-FR" dirty="0"/>
-          </a:p>
-          <a:p>
-            <a:endParaRPr lang="fr-FR" dirty="0"/>
-          </a:p>
-          <a:p>
-            <a:r>
-              <a:rPr lang="fr-FR" dirty="0" smtClean="0"/>
-              <a:t>Par défaut: constructeur vide !</a:t>
-            </a:r>
-          </a:p>
-        </p:txBody>
-      </p:sp>
-      <p:cxnSp>
-        <p:nvCxnSpPr>
-          <p:cNvPr id="5" name="Connecteur droit avec flèche 4"/>
-          <p:cNvCxnSpPr/>
-          <p:nvPr/>
-        </p:nvCxnSpPr>
-        <p:spPr>
-          <a:xfrm flipH="1" flipV="1">
-            <a:off x="3695178" y="3231715"/>
-            <a:ext cx="313151" cy="939452"/>
-          </a:xfrm>
-          <a:prstGeom prst="straightConnector1">
-            <a:avLst/>
-          </a:prstGeom>
-          <a:ln w="57150">
-            <a:tailEnd type="triangle"/>
-          </a:ln>
-        </p:spPr>
-        <p:style>
-          <a:lnRef idx="1">
-            <a:schemeClr val="accent1"/>
-          </a:lnRef>
-          <a:fillRef idx="0">
-            <a:schemeClr val="accent1"/>
-          </a:fillRef>
-          <a:effectRef idx="0">
-            <a:schemeClr val="accent1"/>
-          </a:effectRef>
-          <a:fontRef idx="minor">
-            <a:schemeClr val="tx1"/>
-          </a:fontRef>
-        </p:style>
-      </p:cxnSp>
-    </p:spTree>
-    <p:extLst>
-      <p:ext uri="{BB962C8B-B14F-4D97-AF65-F5344CB8AC3E}">
-        <p14:creationId xmlns:p14="http://schemas.microsoft.com/office/powerpoint/2010/main" val="1619685078"/>
-      </p:ext>
-    </p:extLst>
-  </p:cSld>
-  <p:clrMapOvr>
-    <a:masterClrMapping/>
-  </p:clrMapOvr>
-  <p:timing>
-    <p:tnLst>
-      <p:par>
-        <p:cTn id="1" dur="indefinite" restart="never" nodeType="tmRoot">
-          <p:childTnLst>
-            <p:seq concurrent="1" nextAc="seek">
-              <p:cTn id="2" dur="indefinite" nodeType="mainSeq">
-                <p:childTnLst>
-                  <p:par>
-                    <p:cTn id="3" fill="hold">
-                      <p:stCondLst>
-                        <p:cond delay="indefinite"/>
-                      </p:stCondLst>
-                      <p:childTnLst>
-                        <p:par>
-                          <p:cTn id="4" fill="hold">
-                            <p:stCondLst>
-                              <p:cond delay="0"/>
-                            </p:stCondLst>
-                            <p:childTnLst>
-                              <p:par>
-                                <p:cTn id="5" presetID="1" presetClass="entr" presetSubtype="0" fill="hold" grpId="0" nodeType="clickEffect">
-                                  <p:stCondLst>
-                                    <p:cond delay="0"/>
-                                  </p:stCondLst>
-                                  <p:childTnLst>
-                                    <p:set>
-                                      <p:cBhvr>
-                                        <p:cTn id="6" dur="1" fill="hold">
-                                          <p:stCondLst>
-                                            <p:cond delay="0"/>
-                                          </p:stCondLst>
-                                        </p:cTn>
-                                        <p:tgtEl>
-                                          <p:spTgt spid="3">
-                                            <p:txEl>
-                                              <p:pRg st="0" end="0"/>
-                                            </p:txEl>
-                                          </p:spTgt>
-                                        </p:tgtEl>
-                                        <p:attrNameLst>
-                                          <p:attrName>style.visibility</p:attrName>
-                                        </p:attrNameLst>
-                                      </p:cBhvr>
-                                      <p:to>
-                                        <p:strVal val="visible"/>
-                                      </p:to>
-                                    </p:set>
-                                  </p:childTnLst>
-                                </p:cTn>
-                              </p:par>
-                            </p:childTnLst>
-                          </p:cTn>
-                        </p:par>
-                      </p:childTnLst>
-                    </p:cTn>
-                  </p:par>
-                  <p:par>
-                    <p:cTn id="7" fill="hold">
-                      <p:stCondLst>
-                        <p:cond delay="indefinite"/>
-                      </p:stCondLst>
-                      <p:childTnLst>
-                        <p:par>
-                          <p:cTn id="8" fill="hold">
-                            <p:stCondLst>
-                              <p:cond delay="0"/>
-                            </p:stCondLst>
-                            <p:childTnLst>
-                              <p:par>
-                                <p:cTn id="9" presetID="1" presetClass="entr" presetSubtype="0" fill="hold" grpId="0" nodeType="clickEffect">
-                                  <p:stCondLst>
-                                    <p:cond delay="0"/>
-                                  </p:stCondLst>
-                                  <p:childTnLst>
-                                    <p:set>
-                                      <p:cBhvr>
-                                        <p:cTn id="10" dur="1" fill="hold">
-                                          <p:stCondLst>
-                                            <p:cond delay="0"/>
-                                          </p:stCondLst>
-                                        </p:cTn>
-                                        <p:tgtEl>
-                                          <p:spTgt spid="3">
-                                            <p:txEl>
-                                              <p:pRg st="2" end="2"/>
-                                            </p:txEl>
-                                          </p:spTgt>
-                                        </p:tgtEl>
-                                        <p:attrNameLst>
-                                          <p:attrName>style.visibility</p:attrName>
-                                        </p:attrNameLst>
-                                      </p:cBhvr>
-                                      <p:to>
-                                        <p:strVal val="visible"/>
-                                      </p:to>
-                                    </p:set>
-                                  </p:childTnLst>
-                                </p:cTn>
-                              </p:par>
-                            </p:childTnLst>
-                          </p:cTn>
-                        </p:par>
-                      </p:childTnLst>
-                    </p:cTn>
-                  </p:par>
-                  <p:par>
-                    <p:cTn id="11" fill="hold">
-                      <p:stCondLst>
-                        <p:cond delay="indefinite"/>
-                      </p:stCondLst>
-                      <p:childTnLst>
-                        <p:par>
-                          <p:cTn id="12" fill="hold">
-                            <p:stCondLst>
-                              <p:cond delay="0"/>
-                            </p:stCondLst>
-                            <p:childTnLst>
-                              <p:par>
-                                <p:cTn id="13" presetID="1" presetClass="entr" presetSubtype="0" fill="hold" grpId="0" nodeType="clickEffect">
-                                  <p:stCondLst>
-                                    <p:cond delay="0"/>
-                                  </p:stCondLst>
-                                  <p:childTnLst>
-                                    <p:set>
-                                      <p:cBhvr>
-                                        <p:cTn id="14" dur="1" fill="hold">
-                                          <p:stCondLst>
-                                            <p:cond delay="0"/>
-                                          </p:stCondLst>
-                                        </p:cTn>
-                                        <p:tgtEl>
-                                          <p:spTgt spid="3">
-                                            <p:txEl>
-                                              <p:pRg st="4" end="4"/>
-                                            </p:txEl>
-                                          </p:spTgt>
-                                        </p:tgtEl>
-                                        <p:attrNameLst>
-                                          <p:attrName>style.visibility</p:attrName>
-                                        </p:attrNameLst>
-                                      </p:cBhvr>
-                                      <p:to>
-                                        <p:strVal val="visible"/>
-                                      </p:to>
-                                    </p:set>
-                                  </p:childTnLst>
-                                </p:cTn>
-                              </p:par>
-                            </p:childTnLst>
-                          </p:cTn>
-                        </p:par>
-                      </p:childTnLst>
-                    </p:cTn>
-                  </p:par>
-                  <p:par>
-                    <p:cTn id="15" fill="hold">
-                      <p:stCondLst>
-                        <p:cond delay="indefinite"/>
-                      </p:stCondLst>
-                      <p:childTnLst>
-                        <p:par>
-                          <p:cTn id="16" fill="hold">
-                            <p:stCondLst>
-                              <p:cond delay="0"/>
-                            </p:stCondLst>
-                            <p:childTnLst>
-                              <p:par>
-                                <p:cTn id="17" presetID="1" presetClass="entr" presetSubtype="0" fill="hold" grpId="0" nodeType="clickEffect">
-                                  <p:stCondLst>
-                                    <p:cond delay="0"/>
-                                  </p:stCondLst>
-                                  <p:childTnLst>
-                                    <p:set>
-                                      <p:cBhvr>
-                                        <p:cTn id="18" dur="1" fill="hold">
-                                          <p:stCondLst>
-                                            <p:cond delay="0"/>
-                                          </p:stCondLst>
-                                        </p:cTn>
-                                        <p:tgtEl>
-                                          <p:spTgt spid="3">
-                                            <p:txEl>
-                                              <p:pRg st="5" end="5"/>
-                                            </p:txEl>
-                                          </p:spTgt>
-                                        </p:tgtEl>
-                                        <p:attrNameLst>
-                                          <p:attrName>style.visibility</p:attrName>
-                                        </p:attrNameLst>
-                                      </p:cBhvr>
-                                      <p:to>
-                                        <p:strVal val="visible"/>
-                                      </p:to>
-                                    </p:set>
-                                  </p:childTnLst>
-                                </p:cTn>
-                              </p:par>
-                            </p:childTnLst>
-                          </p:cTn>
-                        </p:par>
-                      </p:childTnLst>
-                    </p:cTn>
-                  </p:par>
-                  <p:par>
-                    <p:cTn id="19" fill="hold">
-                      <p:stCondLst>
-                        <p:cond delay="indefinite"/>
-                      </p:stCondLst>
-                      <p:childTnLst>
-                        <p:par>
-                          <p:cTn id="20" fill="hold">
-                            <p:stCondLst>
-                              <p:cond delay="0"/>
-                            </p:stCondLst>
-                            <p:childTnLst>
-                              <p:par>
-                                <p:cTn id="21" presetID="1" presetClass="entr" presetSubtype="0" fill="hold" grpId="0" nodeType="clickEffect">
-                                  <p:stCondLst>
-                                    <p:cond delay="0"/>
-                                  </p:stCondLst>
-                                  <p:childTnLst>
-                                    <p:set>
-                                      <p:cBhvr>
-                                        <p:cTn id="22" dur="1" fill="hold">
-                                          <p:stCondLst>
-                                            <p:cond delay="0"/>
-                                          </p:stCondLst>
-                                        </p:cTn>
-                                        <p:tgtEl>
-                                          <p:spTgt spid="3">
-                                            <p:txEl>
-                                              <p:pRg st="6" end="6"/>
-                                            </p:txEl>
-                                          </p:spTgt>
-                                        </p:tgtEl>
-                                        <p:attrNameLst>
-                                          <p:attrName>style.visibility</p:attrName>
-                                        </p:attrNameLst>
-                                      </p:cBhvr>
-                                      <p:to>
-                                        <p:strVal val="visible"/>
-                                      </p:to>
-                                    </p:set>
-                                  </p:childTnLst>
-                                </p:cTn>
-                              </p:par>
-                            </p:childTnLst>
-                          </p:cTn>
-                        </p:par>
-                      </p:childTnLst>
-                    </p:cTn>
-                  </p:par>
-                  <p:par>
-                    <p:cTn id="23" fill="hold">
-                      <p:stCondLst>
-                        <p:cond delay="indefinite"/>
-                      </p:stCondLst>
-                      <p:childTnLst>
-                        <p:par>
-                          <p:cTn id="24" fill="hold">
-                            <p:stCondLst>
-                              <p:cond delay="0"/>
-                            </p:stCondLst>
-                            <p:childTnLst>
-                              <p:par>
-                                <p:cTn id="25" presetID="1" presetClass="entr" presetSubtype="0" fill="hold" nodeType="clickEffect">
-                                  <p:stCondLst>
-                                    <p:cond delay="0"/>
-                                  </p:stCondLst>
-                                  <p:childTnLst>
-                                    <p:set>
-                                      <p:cBhvr>
-                                        <p:cTn id="26" dur="1" fill="hold">
-                                          <p:stCondLst>
-                                            <p:cond delay="0"/>
-                                          </p:stCondLst>
-                                        </p:cTn>
-                                        <p:tgtEl>
-                                          <p:spTgt spid="5"/>
-                                        </p:tgtEl>
-                                        <p:attrNameLst>
-                                          <p:attrName>style.visibility</p:attrName>
-                                        </p:attrNameLst>
-                                      </p:cBhvr>
-                                      <p:to>
-                                        <p:strVal val="visible"/>
-                                      </p:to>
-                                    </p:set>
-                                  </p:childTnLst>
-                                </p:cTn>
-                              </p:par>
-                            </p:childTnLst>
-                          </p:cTn>
-                        </p:par>
-                      </p:childTnLst>
-                    </p:cTn>
-                  </p:par>
-                  <p:par>
-                    <p:cTn id="27" fill="hold">
-                      <p:stCondLst>
-                        <p:cond delay="indefinite"/>
-                      </p:stCondLst>
-                      <p:childTnLst>
-                        <p:par>
-                          <p:cTn id="28" fill="hold">
-                            <p:stCondLst>
-                              <p:cond delay="0"/>
-                            </p:stCondLst>
-                            <p:childTnLst>
-                              <p:par>
-                                <p:cTn id="29" presetID="1" presetClass="entr" presetSubtype="0" fill="hold" grpId="0" nodeType="clickEffect">
-                                  <p:stCondLst>
-                                    <p:cond delay="0"/>
-                                  </p:stCondLst>
-                                  <p:childTnLst>
-                                    <p:set>
-                                      <p:cBhvr>
-                                        <p:cTn id="30" dur="1" fill="hold">
-                                          <p:stCondLst>
-                                            <p:cond delay="0"/>
-                                          </p:stCondLst>
-                                        </p:cTn>
-                                        <p:tgtEl>
-                                          <p:spTgt spid="3">
-                                            <p:txEl>
-                                              <p:pRg st="8" end="8"/>
-                                            </p:txEl>
-                                          </p:spTgt>
-                                        </p:tgtEl>
-                                        <p:attrNameLst>
-                                          <p:attrName>style.visibility</p:attrName>
-                                        </p:attrNameLst>
-                                      </p:cBhvr>
-                                      <p:to>
-                                        <p:strVal val="visible"/>
-                                      </p:to>
-                                    </p:set>
-                                  </p:childTnLst>
-                                </p:cTn>
-                              </p:par>
-                            </p:childTnLst>
-                          </p:cTn>
-                        </p:par>
-                      </p:childTnLst>
-                    </p:cTn>
-                  </p:par>
-                  <p:par>
-                    <p:cTn id="31" fill="hold">
-                      <p:stCondLst>
-                        <p:cond delay="indefinite"/>
-                      </p:stCondLst>
-                      <p:childTnLst>
-                        <p:par>
-                          <p:cTn id="32" fill="hold">
-                            <p:stCondLst>
-                              <p:cond delay="0"/>
-                            </p:stCondLst>
-                            <p:childTnLst>
-                              <p:par>
-                                <p:cTn id="33" presetID="1" presetClass="exit" presetSubtype="0" fill="hold" nodeType="clickEffect">
-                                  <p:stCondLst>
-                                    <p:cond delay="0"/>
-                                  </p:stCondLst>
-                                  <p:childTnLst>
-                                    <p:set>
-                                      <p:cBhvr>
-                                        <p:cTn id="34" dur="1" fill="hold">
-                                          <p:stCondLst>
-                                            <p:cond delay="0"/>
-                                          </p:stCondLst>
-                                        </p:cTn>
-                                        <p:tgtEl>
-                                          <p:spTgt spid="3">
-                                            <p:txEl>
-                                              <p:pRg st="5" end="5"/>
-                                            </p:txEl>
-                                          </p:spTgt>
-                                        </p:tgtEl>
-                                        <p:attrNameLst>
-                                          <p:attrName>style.visibility</p:attrName>
-                                        </p:attrNameLst>
-                                      </p:cBhvr>
-                                      <p:to>
-                                        <p:strVal val="hidden"/>
-                                      </p:to>
-                                    </p:set>
-                                  </p:childTnLst>
-                                </p:cTn>
-                              </p:par>
-                            </p:childTnLst>
-                          </p:cTn>
-                        </p:par>
-                      </p:childTnLst>
-                    </p:cTn>
-                  </p:par>
-                </p:childTnLst>
-              </p:cTn>
-              <p:prevCondLst>
-                <p:cond evt="onPrev" delay="0">
-                  <p:tgtEl>
-                    <p:sldTgt/>
-                  </p:tgtEl>
-                </p:cond>
-              </p:prevCondLst>
-              <p:nextCondLst>
-                <p:cond evt="onNext" delay="0">
-                  <p:tgtEl>
-                    <p:sldTgt/>
-                  </p:tgtEl>
-                </p:cond>
-              </p:nextCondLst>
-            </p:seq>
-          </p:childTnLst>
-        </p:cTn>
-      </p:par>
-    </p:tnLst>
-    <p:bldLst>
-      <p:bldP spid="3" grpId="0" uiExpand="1" build="p"/>
-    </p:bldLst>
-  </p:timing>
-</p:sld>
-</file>
-
-<file path=ppt/slides/slide5.xml><?xml version="1.0" encoding="utf-8"?>
-<p:sld xmlns:a="http://schemas.openxmlformats.org/drawingml/2006/main" xmlns:r="http://schemas.openxmlformats.org/officeDocument/2006/relationships" xmlns:p="http://schemas.openxmlformats.org/presentationml/2006/main">
-  <p:cSld>
-    <p:spTree>
-      <p:nvGrpSpPr>
-        <p:cNvPr id="1" name=""/>
-        <p:cNvGrpSpPr/>
-        <p:nvPr/>
-      </p:nvGrpSpPr>
-      <p:grpSpPr>
-        <a:xfrm>
-          <a:off x="0" y="0"/>
-          <a:ext cx="0" cy="0"/>
-          <a:chOff x="0" y="0"/>
-          <a:chExt cx="0" cy="0"/>
-        </a:xfrm>
-      </p:grpSpPr>
-      <p:sp>
-        <p:nvSpPr>
-          <p:cNvPr id="2" name="Titre 1"/>
-          <p:cNvSpPr>
-            <a:spLocks noGrp="1"/>
-          </p:cNvSpPr>
-          <p:nvPr>
-            <p:ph type="title"/>
-          </p:nvPr>
-        </p:nvSpPr>
-        <p:spPr/>
-        <p:txBody>
-          <a:bodyPr/>
-          <a:lstStyle/>
-          <a:p>
-            <a:r>
-              <a:rPr lang="fr-FR" dirty="0" smtClean="0"/>
-              <a:t>Méthode comme une autre =&gt; paramètres</a:t>
-            </a:r>
-            <a:endParaRPr lang="fr-CH" dirty="0"/>
-          </a:p>
-        </p:txBody>
-      </p:sp>
-      <p:sp>
-        <p:nvSpPr>
-          <p:cNvPr id="3" name="Espace réservé du contenu 2"/>
-          <p:cNvSpPr>
-            <a:spLocks noGrp="1"/>
-          </p:cNvSpPr>
-          <p:nvPr>
-            <p:ph idx="1"/>
-          </p:nvPr>
-        </p:nvSpPr>
-        <p:spPr/>
-        <p:txBody>
-          <a:bodyPr/>
-          <a:lstStyle/>
-          <a:p>
-            <a:pPr marL="0" indent="0">
-              <a:buNone/>
-            </a:pPr>
-            <a:r>
-              <a:rPr lang="fr-FR" dirty="0" smtClean="0"/>
-              <a:t>public Person(string </a:t>
-            </a:r>
-            <a:r>
-              <a:rPr lang="fr-FR" dirty="0" err="1" smtClean="0"/>
-              <a:t>name</a:t>
-            </a:r>
-            <a:r>
-              <a:rPr lang="fr-FR" dirty="0" smtClean="0"/>
-              <a:t>)</a:t>
-            </a:r>
-          </a:p>
-          <a:p>
-            <a:pPr marL="0" indent="0">
-              <a:buNone/>
-            </a:pPr>
-            <a:r>
-              <a:rPr lang="fr-FR" dirty="0" smtClean="0"/>
-              <a:t>{</a:t>
-            </a:r>
-          </a:p>
-          <a:p>
-            <a:pPr marL="0" indent="0">
-              <a:buNone/>
-            </a:pPr>
-            <a:r>
-              <a:rPr lang="fr-FR" dirty="0"/>
-              <a:t>	</a:t>
-            </a:r>
-            <a:r>
-              <a:rPr lang="fr-FR" dirty="0" smtClean="0"/>
-              <a:t>//…</a:t>
-            </a:r>
-          </a:p>
-          <a:p>
-            <a:pPr marL="0" indent="0">
-              <a:buNone/>
-            </a:pPr>
-            <a:r>
-              <a:rPr lang="fr-FR" dirty="0" smtClean="0"/>
-              <a:t>}</a:t>
-            </a:r>
-          </a:p>
-          <a:p>
-            <a:pPr marL="0" indent="0">
-              <a:buNone/>
-            </a:pPr>
-            <a:endParaRPr lang="fr-FR" dirty="0"/>
-          </a:p>
-          <a:p>
-            <a:pPr marL="0" indent="0">
-              <a:buNone/>
-            </a:pPr>
-            <a:r>
-              <a:rPr lang="fr-FR" dirty="0" smtClean="0"/>
-              <a:t>var </a:t>
-            </a:r>
-            <a:r>
-              <a:rPr lang="fr-FR" dirty="0" err="1" smtClean="0"/>
-              <a:t>jim</a:t>
-            </a:r>
-            <a:r>
-              <a:rPr lang="fr-FR" dirty="0" smtClean="0"/>
-              <a:t> = new Person("</a:t>
-            </a:r>
-            <a:r>
-              <a:rPr lang="fr-FR" dirty="0" err="1" smtClean="0"/>
-              <a:t>jim</a:t>
-            </a:r>
-            <a:r>
-              <a:rPr lang="fr-FR" dirty="0" smtClean="0"/>
-              <a:t>");</a:t>
-            </a:r>
-            <a:endParaRPr lang="fr-CH" dirty="0"/>
-          </a:p>
-        </p:txBody>
-      </p:sp>
-      <p:cxnSp>
-        <p:nvCxnSpPr>
-          <p:cNvPr id="5" name="Connecteur droit avec flèche 4"/>
-          <p:cNvCxnSpPr/>
-          <p:nvPr/>
-        </p:nvCxnSpPr>
-        <p:spPr>
-          <a:xfrm flipH="1" flipV="1">
-            <a:off x="2927927" y="3011055"/>
-            <a:ext cx="2096655" cy="36945"/>
-          </a:xfrm>
-          <a:prstGeom prst="straightConnector1">
-            <a:avLst/>
-          </a:prstGeom>
-          <a:ln w="57150">
-            <a:tailEnd type="triangle"/>
-          </a:ln>
-        </p:spPr>
-        <p:style>
-          <a:lnRef idx="1">
-            <a:schemeClr val="accent1"/>
-          </a:lnRef>
-          <a:fillRef idx="0">
-            <a:schemeClr val="accent1"/>
-          </a:fillRef>
-          <a:effectRef idx="0">
-            <a:schemeClr val="accent1"/>
-          </a:effectRef>
-          <a:fontRef idx="minor">
-            <a:schemeClr val="tx1"/>
-          </a:fontRef>
-        </p:style>
-      </p:cxnSp>
-      <p:sp>
-        <p:nvSpPr>
-          <p:cNvPr id="6" name="ZoneTexte 5"/>
-          <p:cNvSpPr txBox="1"/>
-          <p:nvPr/>
-        </p:nvSpPr>
-        <p:spPr>
-          <a:xfrm>
-            <a:off x="5085773" y="2724834"/>
-            <a:ext cx="2068945" cy="646331"/>
-          </a:xfrm>
-          <a:prstGeom prst="rect">
-            <a:avLst/>
-          </a:prstGeom>
-          <a:noFill/>
-        </p:spPr>
-        <p:txBody>
-          <a:bodyPr wrap="square" rtlCol="0">
-            <a:spAutoFit/>
-          </a:bodyPr>
-          <a:lstStyle/>
-          <a:p>
-            <a:r>
-              <a:rPr lang="fr-FR" dirty="0" smtClean="0"/>
-              <a:t>Que pourrait-on faire ici ?</a:t>
-            </a:r>
-            <a:endParaRPr lang="fr-CH" dirty="0"/>
-          </a:p>
-        </p:txBody>
-      </p:sp>
-    </p:spTree>
-    <p:extLst>
-      <p:ext uri="{BB962C8B-B14F-4D97-AF65-F5344CB8AC3E}">
-        <p14:creationId xmlns:p14="http://schemas.microsoft.com/office/powerpoint/2010/main" val="524844031"/>
-      </p:ext>
-    </p:extLst>
-  </p:cSld>
-  <p:clrMapOvr>
-    <a:masterClrMapping/>
-  </p:clrMapOvr>
-  <p:timing>
-    <p:tnLst>
-      <p:par>
-        <p:cTn id="1" dur="indefinite" restart="never" nodeType="tmRoot">
-          <p:childTnLst>
-            <p:seq concurrent="1" nextAc="seek">
-              <p:cTn id="2" dur="indefinite" nodeType="mainSeq">
-                <p:childTnLst>
-                  <p:par>
-                    <p:cTn id="3" fill="hold">
-                      <p:stCondLst>
-                        <p:cond delay="indefinite"/>
-                      </p:stCondLst>
-                      <p:childTnLst>
-                        <p:par>
-                          <p:cTn id="4" fill="hold">
-                            <p:stCondLst>
-                              <p:cond delay="0"/>
-                            </p:stCondLst>
-                            <p:childTnLst>
-                              <p:par>
-                                <p:cTn id="5" presetID="1" presetClass="entr" presetSubtype="0" fill="hold" nodeType="clickEffect">
-                                  <p:stCondLst>
-                                    <p:cond delay="0"/>
-                                  </p:stCondLst>
-                                  <p:childTnLst>
-                                    <p:set>
-                                      <p:cBhvr>
-                                        <p:cTn id="6" dur="1" fill="hold">
-                                          <p:stCondLst>
-                                            <p:cond delay="0"/>
-                                          </p:stCondLst>
-                                        </p:cTn>
-                                        <p:tgtEl>
-                                          <p:spTgt spid="3">
-                                            <p:txEl>
-                                              <p:pRg st="0" end="0"/>
-                                            </p:txEl>
-                                          </p:spTgt>
-                                        </p:tgtEl>
-                                        <p:attrNameLst>
-                                          <p:attrName>style.visibility</p:attrName>
-                                        </p:attrNameLst>
-                                      </p:cBhvr>
-                                      <p:to>
-                                        <p:strVal val="visible"/>
-                                      </p:to>
-                                    </p:set>
-                                  </p:childTnLst>
-                                </p:cTn>
-                              </p:par>
-                              <p:par>
-                                <p:cTn id="7" presetID="1" presetClass="entr" presetSubtype="0" fill="hold" nodeType="withEffect">
-                                  <p:stCondLst>
-                                    <p:cond delay="0"/>
-                                  </p:stCondLst>
-                                  <p:childTnLst>
-                                    <p:set>
-                                      <p:cBhvr>
-                                        <p:cTn id="8" dur="1" fill="hold">
-                                          <p:stCondLst>
-                                            <p:cond delay="0"/>
-                                          </p:stCondLst>
-                                        </p:cTn>
-                                        <p:tgtEl>
-                                          <p:spTgt spid="3">
-                                            <p:txEl>
-                                              <p:pRg st="1" end="1"/>
-                                            </p:txEl>
-                                          </p:spTgt>
-                                        </p:tgtEl>
-                                        <p:attrNameLst>
-                                          <p:attrName>style.visibility</p:attrName>
-                                        </p:attrNameLst>
-                                      </p:cBhvr>
-                                      <p:to>
-                                        <p:strVal val="visible"/>
-                                      </p:to>
-                                    </p:set>
-                                  </p:childTnLst>
-                                </p:cTn>
-                              </p:par>
-                              <p:par>
-                                <p:cTn id="9" presetID="1" presetClass="entr" presetSubtype="0" fill="hold" nodeType="withEffect">
-                                  <p:stCondLst>
-                                    <p:cond delay="0"/>
-                                  </p:stCondLst>
-                                  <p:childTnLst>
-                                    <p:set>
-                                      <p:cBhvr>
-                                        <p:cTn id="10" dur="1" fill="hold">
-                                          <p:stCondLst>
-                                            <p:cond delay="0"/>
-                                          </p:stCondLst>
-                                        </p:cTn>
-                                        <p:tgtEl>
-                                          <p:spTgt spid="3">
-                                            <p:txEl>
-                                              <p:pRg st="2" end="2"/>
-                                            </p:txEl>
-                                          </p:spTgt>
-                                        </p:tgtEl>
-                                        <p:attrNameLst>
-                                          <p:attrName>style.visibility</p:attrName>
-                                        </p:attrNameLst>
-                                      </p:cBhvr>
-                                      <p:to>
-                                        <p:strVal val="visible"/>
-                                      </p:to>
-                                    </p:set>
-                                  </p:childTnLst>
-                                </p:cTn>
-                              </p:par>
-                              <p:par>
-                                <p:cTn id="11" presetID="1" presetClass="entr" presetSubtype="0" fill="hold" nodeType="withEffect">
-                                  <p:stCondLst>
-                                    <p:cond delay="0"/>
-                                  </p:stCondLst>
-                                  <p:childTnLst>
-                                    <p:set>
-                                      <p:cBhvr>
-                                        <p:cTn id="12" dur="1" fill="hold">
-                                          <p:stCondLst>
-                                            <p:cond delay="0"/>
-                                          </p:stCondLst>
-                                        </p:cTn>
-                                        <p:tgtEl>
-                                          <p:spTgt spid="3">
-                                            <p:txEl>
-                                              <p:pRg st="3" end="3"/>
-                                            </p:txEl>
-                                          </p:spTgt>
-                                        </p:tgtEl>
-                                        <p:attrNameLst>
-                                          <p:attrName>style.visibility</p:attrName>
-                                        </p:attrNameLst>
-                                      </p:cBhvr>
-                                      <p:to>
-                                        <p:strVal val="visible"/>
-                                      </p:to>
-                                    </p:set>
-                                  </p:childTnLst>
-                                </p:cTn>
-                              </p:par>
-                            </p:childTnLst>
-                          </p:cTn>
-                        </p:par>
-                      </p:childTnLst>
-                    </p:cTn>
-                  </p:par>
-                  <p:par>
-                    <p:cTn id="13" fill="hold">
-                      <p:stCondLst>
-                        <p:cond delay="indefinite"/>
-                      </p:stCondLst>
-                      <p:childTnLst>
-                        <p:par>
-                          <p:cTn id="14" fill="hold">
-                            <p:stCondLst>
-                              <p:cond delay="0"/>
-                            </p:stCondLst>
-                            <p:childTnLst>
-                              <p:par>
-                                <p:cTn id="15" presetID="1" presetClass="entr" presetSubtype="0" fill="hold" nodeType="clickEffect">
-                                  <p:stCondLst>
-                                    <p:cond delay="0"/>
-                                  </p:stCondLst>
-                                  <p:childTnLst>
-                                    <p:set>
-                                      <p:cBhvr>
-                                        <p:cTn id="16" dur="1" fill="hold">
-                                          <p:stCondLst>
-                                            <p:cond delay="0"/>
-                                          </p:stCondLst>
-                                        </p:cTn>
-                                        <p:tgtEl>
-                                          <p:spTgt spid="3">
-                                            <p:txEl>
-                                              <p:pRg st="5" end="5"/>
-                                            </p:txEl>
-                                          </p:spTgt>
-                                        </p:tgtEl>
-                                        <p:attrNameLst>
-                                          <p:attrName>style.visibility</p:attrName>
-                                        </p:attrNameLst>
-                                      </p:cBhvr>
-                                      <p:to>
-                                        <p:strVal val="visible"/>
-                                      </p:to>
-                                    </p:set>
-                                  </p:childTnLst>
-                                </p:cTn>
-                              </p:par>
-                            </p:childTnLst>
-                          </p:cTn>
-                        </p:par>
-                      </p:childTnLst>
-                    </p:cTn>
-                  </p:par>
-                  <p:par>
-                    <p:cTn id="17" fill="hold">
-                      <p:stCondLst>
-                        <p:cond delay="indefinite"/>
-                      </p:stCondLst>
-                      <p:childTnLst>
-                        <p:par>
-                          <p:cTn id="18" fill="hold">
-                            <p:stCondLst>
-                              <p:cond delay="0"/>
-                            </p:stCondLst>
-                            <p:childTnLst>
-                              <p:par>
-                                <p:cTn id="19" presetID="1" presetClass="entr" presetSubtype="0" fill="hold" grpId="0" nodeType="clickEffect">
-                                  <p:stCondLst>
-                                    <p:cond delay="0"/>
-                                  </p:stCondLst>
-                                  <p:childTnLst>
-                                    <p:set>
-                                      <p:cBhvr>
-                                        <p:cTn id="20" dur="1" fill="hold">
-                                          <p:stCondLst>
-                                            <p:cond delay="0"/>
-                                          </p:stCondLst>
-                                        </p:cTn>
-                                        <p:tgtEl>
-                                          <p:spTgt spid="6"/>
-                                        </p:tgtEl>
-                                        <p:attrNameLst>
-                                          <p:attrName>style.visibility</p:attrName>
-                                        </p:attrNameLst>
-                                      </p:cBhvr>
-                                      <p:to>
-                                        <p:strVal val="visible"/>
-                                      </p:to>
-                                    </p:set>
-                                  </p:childTnLst>
-                                </p:cTn>
-                              </p:par>
-                              <p:par>
-                                <p:cTn id="21" presetID="1" presetClass="entr" presetSubtype="0" fill="hold" nodeType="withEffect">
-                                  <p:stCondLst>
-                                    <p:cond delay="0"/>
-                                  </p:stCondLst>
-                                  <p:childTnLst>
-                                    <p:set>
-                                      <p:cBhvr>
-                                        <p:cTn id="22" dur="1" fill="hold">
-                                          <p:stCondLst>
-                                            <p:cond delay="0"/>
-                                          </p:stCondLst>
-                                        </p:cTn>
-                                        <p:tgtEl>
-                                          <p:spTgt spid="5"/>
-                                        </p:tgtEl>
-                                        <p:attrNameLst>
-                                          <p:attrName>style.visibility</p:attrName>
-                                        </p:attrNameLst>
-                                      </p:cBhvr>
-                                      <p:to>
-                                        <p:strVal val="visible"/>
-                                      </p:to>
-                                    </p:set>
-                                  </p:childTnLst>
-                                </p:cTn>
-                              </p:par>
-                            </p:childTnLst>
-                          </p:cTn>
-                        </p:par>
-                      </p:childTnLst>
-                    </p:cTn>
-                  </p:par>
-                </p:childTnLst>
-              </p:cTn>
-              <p:prevCondLst>
-                <p:cond evt="onPrev" delay="0">
-                  <p:tgtEl>
-                    <p:sldTgt/>
-                  </p:tgtEl>
-                </p:cond>
-              </p:prevCondLst>
-              <p:nextCondLst>
-                <p:cond evt="onNext" delay="0">
-                  <p:tgtEl>
-                    <p:sldTgt/>
-                  </p:tgtEl>
-                </p:cond>
-              </p:nextCondLst>
-            </p:seq>
-          </p:childTnLst>
-        </p:cTn>
-      </p:par>
-    </p:tnLst>
-    <p:bldLst>
-      <p:bldP spid="6" grpId="0"/>
-    </p:bldLst>
-  </p:timing>
-</p:sld>
-</file>
-
-<file path=ppt/slides/slide6.xml><?xml version="1.0" encoding="utf-8"?>
 <p:sld xmlns:a="http://schemas.openxmlformats.org/drawingml/2006/main" xmlns:r="http://schemas.openxmlformats.org/officeDocument/2006/relationships" xmlns:p="http://schemas.openxmlformats.org/presentationml/2006/main">
   <p:cSld>
     <p:spTree>
@@ -5979,6 +3458,15 @@
 </file>
 
 <file path=customXml/item1.xml><?xml version="1.0" encoding="utf-8"?>
+<?mso-contentType ?>
+<FormTemplates xmlns="http://schemas.microsoft.com/sharepoint/v3/contenttype/forms">
+  <Display>DocumentLibraryForm</Display>
+  <Edit>DocumentLibraryForm</Edit>
+  <New>DocumentLibraryForm</New>
+</FormTemplates>
+</file>
+
+<file path=customXml/item2.xml><?xml version="1.0" encoding="utf-8"?>
 <ct:contentTypeSchema xmlns:ct="http://schemas.microsoft.com/office/2006/metadata/contentType" xmlns:ma="http://schemas.microsoft.com/office/2006/metadata/properties/metaAttributes" ct:_="" ma:_="" ma:contentTypeName="Document" ma:contentTypeID="0x0101001ABD9BFFC9E543439C53A2705AE306EF" ma:contentTypeVersion="18" ma:contentTypeDescription="Crée un document." ma:contentTypeScope="" ma:versionID="49fff389824721c569041f6a3d2d54e9">
   <xsd:schema xmlns:xsd="http://www.w3.org/2001/XMLSchema" xmlns:xs="http://www.w3.org/2001/XMLSchema" xmlns:p="http://schemas.microsoft.com/office/2006/metadata/properties" xmlns:ns2="bf2f2df3-a963-4452-b0e7-67dabc627c35" xmlns:ns3="http://schemas.microsoft.com/sharepoint/v4" xmlns:ns4="f7d9f5a6-831d-4621-8c77-cbcaf993e406" targetNamespace="http://schemas.microsoft.com/office/2006/metadata/properties" ma:root="true" ma:fieldsID="9061cd853e653d4991f2824722d07c1b" ns2:_="" ns3:_="" ns4:_="">
     <xsd:import namespace="bf2f2df3-a963-4452-b0e7-67dabc627c35"/>
@@ -6238,15 +3726,6 @@
 </ct:contentTypeSchema>
 </file>
 
-<file path=customXml/item2.xml><?xml version="1.0" encoding="utf-8"?>
-<?mso-contentType ?>
-<FormTemplates xmlns="http://schemas.microsoft.com/sharepoint/v3/contenttype/forms">
-  <Display>DocumentLibraryForm</Display>
-  <Edit>DocumentLibraryForm</Edit>
-  <New>DocumentLibraryForm</New>
-</FormTemplates>
-</file>
-
 <file path=customXml/item3.xml><?xml version="1.0" encoding="utf-8"?>
 <p:properties xmlns:p="http://schemas.microsoft.com/office/2006/metadata/properties" xmlns:xsi="http://www.w3.org/2001/XMLSchema-instance" xmlns:pc="http://schemas.microsoft.com/office/infopath/2007/PartnerControls">
   <documentManagement>
@@ -6260,6 +3739,14 @@
 </file>
 
 <file path=customXml/itemProps1.xml><?xml version="1.0" encoding="utf-8"?>
+<ds:datastoreItem xmlns:ds="http://schemas.openxmlformats.org/officeDocument/2006/customXml" ds:itemID="{C182078B-F8DF-4D9F-86C3-CA77AFB8B093}">
+  <ds:schemaRefs>
+    <ds:schemaRef ds:uri="http://schemas.microsoft.com/sharepoint/v3/contenttype/forms"/>
+  </ds:schemaRefs>
+</ds:datastoreItem>
+</file>
+
+<file path=customXml/itemProps2.xml><?xml version="1.0" encoding="utf-8"?>
 <ds:datastoreItem xmlns:ds="http://schemas.openxmlformats.org/officeDocument/2006/customXml" ds:itemID="{0062CB57-4EAE-48D7-8AE7-3D11A5DF7426}">
   <ds:schemaRefs>
     <ds:schemaRef ds:uri="http://schemas.microsoft.com/office/2006/metadata/contentType"/>
@@ -6279,28 +3766,20 @@
 </ds:datastoreItem>
 </file>
 
-<file path=customXml/itemProps2.xml><?xml version="1.0" encoding="utf-8"?>
-<ds:datastoreItem xmlns:ds="http://schemas.openxmlformats.org/officeDocument/2006/customXml" ds:itemID="{C182078B-F8DF-4D9F-86C3-CA77AFB8B093}">
-  <ds:schemaRefs>
-    <ds:schemaRef ds:uri="http://schemas.microsoft.com/sharepoint/v3/contenttype/forms"/>
-  </ds:schemaRefs>
-</ds:datastoreItem>
-</file>
-
 <file path=customXml/itemProps3.xml><?xml version="1.0" encoding="utf-8"?>
 <ds:datastoreItem xmlns:ds="http://schemas.openxmlformats.org/officeDocument/2006/customXml" ds:itemID="{01E070F6-B6E4-4A85-B5F7-0336AE684D7A}">
   <ds:schemaRefs>
+    <ds:schemaRef ds:uri="http://schemas.microsoft.com/office/2006/documentManagement/types"/>
+    <ds:schemaRef ds:uri="http://schemas.microsoft.com/office/2006/metadata/properties"/>
+    <ds:schemaRef ds:uri="http://purl.org/dc/elements/1.1/"/>
+    <ds:schemaRef ds:uri="http://schemas.microsoft.com/sharepoint/v4"/>
+    <ds:schemaRef ds:uri="http://schemas.openxmlformats.org/package/2006/metadata/core-properties"/>
     <ds:schemaRef ds:uri="http://purl.org/dc/terms/"/>
+    <ds:schemaRef ds:uri="f7d9f5a6-831d-4621-8c77-cbcaf993e406"/>
+    <ds:schemaRef ds:uri="http://schemas.microsoft.com/office/infopath/2007/PartnerControls"/>
+    <ds:schemaRef ds:uri="bf2f2df3-a963-4452-b0e7-67dabc627c35"/>
+    <ds:schemaRef ds:uri="http://www.w3.org/XML/1998/namespace"/>
     <ds:schemaRef ds:uri="http://purl.org/dc/dcmitype/"/>
-    <ds:schemaRef ds:uri="http://schemas.microsoft.com/sharepoint/v4"/>
-    <ds:schemaRef ds:uri="http://schemas.microsoft.com/office/2006/documentManagement/types"/>
-    <ds:schemaRef ds:uri="http://schemas.openxmlformats.org/package/2006/metadata/core-properties"/>
-    <ds:schemaRef ds:uri="http://purl.org/dc/elements/1.1/"/>
-    <ds:schemaRef ds:uri="f7d9f5a6-831d-4621-8c77-cbcaf993e406"/>
-    <ds:schemaRef ds:uri="bf2f2df3-a963-4452-b0e7-67dabc627c35"/>
-    <ds:schemaRef ds:uri="http://schemas.microsoft.com/office/infopath/2007/PartnerControls"/>
-    <ds:schemaRef ds:uri="http://schemas.microsoft.com/office/2006/metadata/properties"/>
-    <ds:schemaRef ds:uri="http://www.w3.org/XML/1998/namespace"/>
   </ds:schemaRefs>
 </ds:datastoreItem>
 </file>
</xml_diff>